<commit_message>
Large rebuild of model strcuture and logic
</commit_message>
<xml_diff>
--- a/Presentation.pptx
+++ b/Presentation.pptx
@@ -5,25 +5,23 @@
     <p:sldMasterId id="2147483648" r:id="rId4"/>
   </p:sldMasterIdLst>
   <p:notesMasterIdLst>
-    <p:notesMasterId r:id="rId18"/>
+    <p:notesMasterId r:id="rId16"/>
   </p:notesMasterIdLst>
   <p:handoutMasterIdLst>
-    <p:handoutMasterId r:id="rId19"/>
+    <p:handoutMasterId r:id="rId17"/>
   </p:handoutMasterIdLst>
   <p:sldIdLst>
     <p:sldId id="256" r:id="rId5"/>
     <p:sldId id="257" r:id="rId6"/>
     <p:sldId id="278" r:id="rId7"/>
-    <p:sldId id="279" r:id="rId8"/>
-    <p:sldId id="258" r:id="rId9"/>
-    <p:sldId id="280" r:id="rId10"/>
-    <p:sldId id="281" r:id="rId11"/>
-    <p:sldId id="282" r:id="rId12"/>
-    <p:sldId id="266" r:id="rId13"/>
-    <p:sldId id="283" r:id="rId14"/>
-    <p:sldId id="284" r:id="rId15"/>
-    <p:sldId id="285" r:id="rId16"/>
-    <p:sldId id="271" r:id="rId17"/>
+    <p:sldId id="258" r:id="rId8"/>
+    <p:sldId id="280" r:id="rId9"/>
+    <p:sldId id="282" r:id="rId10"/>
+    <p:sldId id="266" r:id="rId11"/>
+    <p:sldId id="283" r:id="rId12"/>
+    <p:sldId id="284" r:id="rId13"/>
+    <p:sldId id="285" r:id="rId14"/>
+    <p:sldId id="271" r:id="rId15"/>
   </p:sldIdLst>
   <p:sldSz cx="12192000" cy="6858000"/>
   <p:notesSz cx="6858000" cy="9144000"/>
@@ -829,7 +827,7 @@
     </p:spTree>
     <p:extLst>
       <p:ext uri="{BB962C8B-B14F-4D97-AF65-F5344CB8AC3E}">
-        <p14:creationId xmlns:p14="http://schemas.microsoft.com/office/powerpoint/2010/main" val="840986708"/>
+        <p14:creationId xmlns:p14="http://schemas.microsoft.com/office/powerpoint/2010/main" val="537756"/>
       </p:ext>
     </p:extLst>
   </p:cSld>
@@ -905,174 +903,6 @@
             <a:fld id="{22289C57-55D7-40A4-A101-E74FAC7A092B}" type="slidenum">
               <a:rPr lang="en-US" smtClean="0"/>
               <a:t>11</a:t>
-            </a:fld>
-            <a:endParaRPr lang="en-US" dirty="0"/>
-          </a:p>
-        </p:txBody>
-      </p:sp>
-    </p:spTree>
-    <p:extLst>
-      <p:ext uri="{BB962C8B-B14F-4D97-AF65-F5344CB8AC3E}">
-        <p14:creationId xmlns:p14="http://schemas.microsoft.com/office/powerpoint/2010/main" val="575465472"/>
-      </p:ext>
-    </p:extLst>
-  </p:cSld>
-  <p:clrMapOvr>
-    <a:masterClrMapping/>
-  </p:clrMapOvr>
-</p:notes>
-</file>
-
-<file path=ppt/notesSlides/notesSlide12.xml><?xml version="1.0" encoding="utf-8"?>
-<p:notes xmlns:a="http://schemas.openxmlformats.org/drawingml/2006/main" xmlns:r="http://schemas.openxmlformats.org/officeDocument/2006/relationships" xmlns:p="http://schemas.openxmlformats.org/presentationml/2006/main">
-  <p:cSld>
-    <p:spTree>
-      <p:nvGrpSpPr>
-        <p:cNvPr id="1" name=""/>
-        <p:cNvGrpSpPr/>
-        <p:nvPr/>
-      </p:nvGrpSpPr>
-      <p:grpSpPr>
-        <a:xfrm>
-          <a:off x="0" y="0"/>
-          <a:ext cx="0" cy="0"/>
-          <a:chOff x="0" y="0"/>
-          <a:chExt cx="0" cy="0"/>
-        </a:xfrm>
-      </p:grpSpPr>
-      <p:sp>
-        <p:nvSpPr>
-          <p:cNvPr id="2" name="Slide Image Placeholder 1"/>
-          <p:cNvSpPr>
-            <a:spLocks noGrp="1" noRot="1" noChangeAspect="1"/>
-          </p:cNvSpPr>
-          <p:nvPr>
-            <p:ph type="sldImg"/>
-          </p:nvPr>
-        </p:nvSpPr>
-        <p:spPr/>
-      </p:sp>
-      <p:sp>
-        <p:nvSpPr>
-          <p:cNvPr id="3" name="Notes Placeholder 2"/>
-          <p:cNvSpPr>
-            <a:spLocks noGrp="1"/>
-          </p:cNvSpPr>
-          <p:nvPr>
-            <p:ph type="body" idx="1"/>
-          </p:nvPr>
-        </p:nvSpPr>
-        <p:spPr/>
-        <p:txBody>
-          <a:bodyPr/>
-          <a:lstStyle/>
-          <a:p>
-            <a:endParaRPr lang="en-US" dirty="0"/>
-          </a:p>
-        </p:txBody>
-      </p:sp>
-      <p:sp>
-        <p:nvSpPr>
-          <p:cNvPr id="4" name="Slide Number Placeholder 3"/>
-          <p:cNvSpPr>
-            <a:spLocks noGrp="1"/>
-          </p:cNvSpPr>
-          <p:nvPr>
-            <p:ph type="sldNum" sz="quarter" idx="5"/>
-          </p:nvPr>
-        </p:nvSpPr>
-        <p:spPr/>
-        <p:txBody>
-          <a:bodyPr/>
-          <a:lstStyle/>
-          <a:p>
-            <a:fld id="{22289C57-55D7-40A4-A101-E74FAC7A092B}" type="slidenum">
-              <a:rPr lang="en-US" smtClean="0"/>
-              <a:t>12</a:t>
-            </a:fld>
-            <a:endParaRPr lang="en-US" dirty="0"/>
-          </a:p>
-        </p:txBody>
-      </p:sp>
-    </p:spTree>
-    <p:extLst>
-      <p:ext uri="{BB962C8B-B14F-4D97-AF65-F5344CB8AC3E}">
-        <p14:creationId xmlns:p14="http://schemas.microsoft.com/office/powerpoint/2010/main" val="537756"/>
-      </p:ext>
-    </p:extLst>
-  </p:cSld>
-  <p:clrMapOvr>
-    <a:masterClrMapping/>
-  </p:clrMapOvr>
-</p:notes>
-</file>
-
-<file path=ppt/notesSlides/notesSlide13.xml><?xml version="1.0" encoding="utf-8"?>
-<p:notes xmlns:a="http://schemas.openxmlformats.org/drawingml/2006/main" xmlns:r="http://schemas.openxmlformats.org/officeDocument/2006/relationships" xmlns:p="http://schemas.openxmlformats.org/presentationml/2006/main">
-  <p:cSld>
-    <p:spTree>
-      <p:nvGrpSpPr>
-        <p:cNvPr id="1" name=""/>
-        <p:cNvGrpSpPr/>
-        <p:nvPr/>
-      </p:nvGrpSpPr>
-      <p:grpSpPr>
-        <a:xfrm>
-          <a:off x="0" y="0"/>
-          <a:ext cx="0" cy="0"/>
-          <a:chOff x="0" y="0"/>
-          <a:chExt cx="0" cy="0"/>
-        </a:xfrm>
-      </p:grpSpPr>
-      <p:sp>
-        <p:nvSpPr>
-          <p:cNvPr id="2" name="Slide Image Placeholder 1"/>
-          <p:cNvSpPr>
-            <a:spLocks noGrp="1" noRot="1" noChangeAspect="1"/>
-          </p:cNvSpPr>
-          <p:nvPr>
-            <p:ph type="sldImg"/>
-          </p:nvPr>
-        </p:nvSpPr>
-        <p:spPr/>
-      </p:sp>
-      <p:sp>
-        <p:nvSpPr>
-          <p:cNvPr id="3" name="Notes Placeholder 2"/>
-          <p:cNvSpPr>
-            <a:spLocks noGrp="1"/>
-          </p:cNvSpPr>
-          <p:nvPr>
-            <p:ph type="body" idx="1"/>
-          </p:nvPr>
-        </p:nvSpPr>
-        <p:spPr/>
-        <p:txBody>
-          <a:bodyPr/>
-          <a:lstStyle/>
-          <a:p>
-            <a:endParaRPr lang="en-US" dirty="0"/>
-          </a:p>
-        </p:txBody>
-      </p:sp>
-      <p:sp>
-        <p:nvSpPr>
-          <p:cNvPr id="4" name="Slide Number Placeholder 3"/>
-          <p:cNvSpPr>
-            <a:spLocks noGrp="1"/>
-          </p:cNvSpPr>
-          <p:nvPr>
-            <p:ph type="sldNum" sz="quarter" idx="5"/>
-          </p:nvPr>
-        </p:nvSpPr>
-        <p:spPr/>
-        <p:txBody>
-          <a:bodyPr/>
-          <a:lstStyle/>
-          <a:p>
-            <a:fld id="{22289C57-55D7-40A4-A101-E74FAC7A092B}" type="slidenum">
-              <a:rPr lang="en-US" smtClean="0"/>
-              <a:t>13</a:t>
             </a:fld>
             <a:endParaRPr lang="en-US" dirty="0"/>
           </a:p>
@@ -1333,7 +1163,7 @@
     </p:spTree>
     <p:extLst>
       <p:ext uri="{BB962C8B-B14F-4D97-AF65-F5344CB8AC3E}">
-        <p14:creationId xmlns:p14="http://schemas.microsoft.com/office/powerpoint/2010/main" val="2090324125"/>
+        <p14:creationId xmlns:p14="http://schemas.microsoft.com/office/powerpoint/2010/main" val="2843954456"/>
       </p:ext>
     </p:extLst>
   </p:cSld>
@@ -1417,7 +1247,7 @@
     </p:spTree>
     <p:extLst>
       <p:ext uri="{BB962C8B-B14F-4D97-AF65-F5344CB8AC3E}">
-        <p14:creationId xmlns:p14="http://schemas.microsoft.com/office/powerpoint/2010/main" val="2843954456"/>
+        <p14:creationId xmlns:p14="http://schemas.microsoft.com/office/powerpoint/2010/main" val="2066144023"/>
       </p:ext>
     </p:extLst>
   </p:cSld>
@@ -1501,7 +1331,7 @@
     </p:spTree>
     <p:extLst>
       <p:ext uri="{BB962C8B-B14F-4D97-AF65-F5344CB8AC3E}">
-        <p14:creationId xmlns:p14="http://schemas.microsoft.com/office/powerpoint/2010/main" val="2066144023"/>
+        <p14:creationId xmlns:p14="http://schemas.microsoft.com/office/powerpoint/2010/main" val="236659336"/>
       </p:ext>
     </p:extLst>
   </p:cSld>
@@ -1585,7 +1415,7 @@
     </p:spTree>
     <p:extLst>
       <p:ext uri="{BB962C8B-B14F-4D97-AF65-F5344CB8AC3E}">
-        <p14:creationId xmlns:p14="http://schemas.microsoft.com/office/powerpoint/2010/main" val="1025326889"/>
+        <p14:creationId xmlns:p14="http://schemas.microsoft.com/office/powerpoint/2010/main" val="3105683219"/>
       </p:ext>
     </p:extLst>
   </p:cSld>
@@ -1669,7 +1499,7 @@
     </p:spTree>
     <p:extLst>
       <p:ext uri="{BB962C8B-B14F-4D97-AF65-F5344CB8AC3E}">
-        <p14:creationId xmlns:p14="http://schemas.microsoft.com/office/powerpoint/2010/main" val="236659336"/>
+        <p14:creationId xmlns:p14="http://schemas.microsoft.com/office/powerpoint/2010/main" val="840986708"/>
       </p:ext>
     </p:extLst>
   </p:cSld>
@@ -1753,7 +1583,7 @@
     </p:spTree>
     <p:extLst>
       <p:ext uri="{BB962C8B-B14F-4D97-AF65-F5344CB8AC3E}">
-        <p14:creationId xmlns:p14="http://schemas.microsoft.com/office/powerpoint/2010/main" val="3105683219"/>
+        <p14:creationId xmlns:p14="http://schemas.microsoft.com/office/powerpoint/2010/main" val="575465472"/>
       </p:ext>
     </p:extLst>
   </p:cSld>
@@ -7190,6 +7020,1571 @@
       </p:grpSpPr>
       <p:sp>
         <p:nvSpPr>
+          <p:cNvPr id="8" name="Title 2">
+            <a:extLst>
+              <a:ext uri="{FF2B5EF4-FFF2-40B4-BE49-F238E27FC236}">
+                <a16:creationId xmlns:a16="http://schemas.microsoft.com/office/drawing/2014/main" id="{3E5FEE2D-79E5-4C1D-8BF7-EE619CA7039A}"/>
+              </a:ext>
+            </a:extLst>
+          </p:cNvPr>
+          <p:cNvSpPr>
+            <a:spLocks noGrp="1"/>
+          </p:cNvSpPr>
+          <p:nvPr>
+            <p:ph type="title"/>
+          </p:nvPr>
+        </p:nvSpPr>
+        <p:spPr>
+          <a:xfrm>
+            <a:off x="838200" y="353550"/>
+            <a:ext cx="10515600" cy="1325563"/>
+          </a:xfrm>
+        </p:spPr>
+        <p:txBody>
+          <a:bodyPr anchor="b"/>
+          <a:lstStyle/>
+          <a:p>
+            <a:r>
+              <a:rPr lang="en-US" dirty="0"/>
+              <a:t>Speaking engagement metrics</a:t>
+            </a:r>
+          </a:p>
+        </p:txBody>
+      </p:sp>
+      <p:graphicFrame>
+        <p:nvGraphicFramePr>
+          <p:cNvPr id="13" name="Table Placeholder 2">
+            <a:extLst>
+              <a:ext uri="{FF2B5EF4-FFF2-40B4-BE49-F238E27FC236}">
+                <a16:creationId xmlns:a16="http://schemas.microsoft.com/office/drawing/2014/main" id="{4A94C7BE-6E60-66F0-EFD4-2F452B0D743A}"/>
+              </a:ext>
+            </a:extLst>
+          </p:cNvPr>
+          <p:cNvGraphicFramePr>
+            <a:graphicFrameLocks noGrp="1"/>
+          </p:cNvGraphicFramePr>
+          <p:nvPr>
+            <p:ph type="tbl" sz="quarter" idx="14"/>
+            <p:extLst>
+              <p:ext uri="{D42A27DB-BD31-4B8C-83A1-F6EECF244321}">
+                <p14:modId xmlns:p14="http://schemas.microsoft.com/office/powerpoint/2010/main" val="1224246859"/>
+              </p:ext>
+            </p:extLst>
+          </p:nvPr>
+        </p:nvGraphicFramePr>
+        <p:xfrm>
+          <a:off x="838200" y="2111375"/>
+          <a:ext cx="10515601" cy="3570968"/>
+        </p:xfrm>
+        <a:graphic>
+          <a:graphicData uri="http://schemas.openxmlformats.org/drawingml/2006/table">
+            <a:tbl>
+              <a:tblPr firstRow="1" bandRow="1">
+                <a:tableStyleId>{7E9639D4-E3E2-4D34-9284-5A2195B3D0D7}</a:tableStyleId>
+              </a:tblPr>
+              <a:tblGrid>
+                <a:gridCol w="3433998">
+                  <a:extLst>
+                    <a:ext uri="{9D8B030D-6E8A-4147-A177-3AD203B41FA5}">
+                      <a16:colId xmlns:a16="http://schemas.microsoft.com/office/drawing/2014/main" val="127040821"/>
+                    </a:ext>
+                  </a:extLst>
+                </a:gridCol>
+                <a:gridCol w="2450892">
+                  <a:extLst>
+                    <a:ext uri="{9D8B030D-6E8A-4147-A177-3AD203B41FA5}">
+                      <a16:colId xmlns:a16="http://schemas.microsoft.com/office/drawing/2014/main" val="149845700"/>
+                    </a:ext>
+                  </a:extLst>
+                </a:gridCol>
+                <a:gridCol w="2375942">
+                  <a:extLst>
+                    <a:ext uri="{9D8B030D-6E8A-4147-A177-3AD203B41FA5}">
+                      <a16:colId xmlns:a16="http://schemas.microsoft.com/office/drawing/2014/main" val="3119692462"/>
+                    </a:ext>
+                  </a:extLst>
+                </a:gridCol>
+                <a:gridCol w="2254769">
+                  <a:extLst>
+                    <a:ext uri="{9D8B030D-6E8A-4147-A177-3AD203B41FA5}">
+                      <a16:colId xmlns:a16="http://schemas.microsoft.com/office/drawing/2014/main" val="3472639139"/>
+                    </a:ext>
+                  </a:extLst>
+                </a:gridCol>
+              </a:tblGrid>
+              <a:tr h="733347">
+                <a:tc>
+                  <a:txBody>
+                    <a:bodyPr/>
+                    <a:lstStyle/>
+                    <a:p>
+                      <a:pPr algn="ctr"/>
+                      <a:r>
+                        <a:rPr lang="en-US" b="0" dirty="0"/>
+                        <a:t>IMPACT FACTOR</a:t>
+                      </a:r>
+                    </a:p>
+                  </a:txBody>
+                  <a:tcPr anchor="ctr"/>
+                </a:tc>
+                <a:tc>
+                  <a:txBody>
+                    <a:bodyPr/>
+                    <a:lstStyle/>
+                    <a:p>
+                      <a:pPr algn="ctr"/>
+                      <a:r>
+                        <a:rPr lang="en-US" b="0" dirty="0"/>
+                        <a:t>MEASUREMENT</a:t>
+                      </a:r>
+                    </a:p>
+                  </a:txBody>
+                  <a:tcPr anchor="ctr"/>
+                </a:tc>
+                <a:tc>
+                  <a:txBody>
+                    <a:bodyPr/>
+                    <a:lstStyle/>
+                    <a:p>
+                      <a:pPr algn="ctr"/>
+                      <a:r>
+                        <a:rPr lang="en-US" b="0" dirty="0"/>
+                        <a:t>TARGET</a:t>
+                      </a:r>
+                    </a:p>
+                  </a:txBody>
+                  <a:tcPr anchor="ctr"/>
+                </a:tc>
+                <a:tc>
+                  <a:txBody>
+                    <a:bodyPr/>
+                    <a:lstStyle/>
+                    <a:p>
+                      <a:pPr algn="ctr"/>
+                      <a:r>
+                        <a:rPr lang="en-US" b="0" dirty="0"/>
+                        <a:t>ACHIEVED</a:t>
+                      </a:r>
+                    </a:p>
+                  </a:txBody>
+                  <a:tcPr anchor="ctr"/>
+                </a:tc>
+                <a:extLst>
+                  <a:ext uri="{0D108BD9-81ED-4DB2-BD59-A6C34878D82A}">
+                    <a16:rowId xmlns:a16="http://schemas.microsoft.com/office/drawing/2014/main" val="3298013591"/>
+                  </a:ext>
+                </a:extLst>
+              </a:tr>
+              <a:tr h="531843">
+                <a:tc>
+                  <a:txBody>
+                    <a:bodyPr/>
+                    <a:lstStyle/>
+                    <a:p>
+                      <a:pPr algn="ctr"/>
+                      <a:r>
+                        <a:rPr lang="en-US" dirty="0"/>
+                        <a:t>Audience interaction</a:t>
+                      </a:r>
+                    </a:p>
+                  </a:txBody>
+                  <a:tcPr anchor="ctr"/>
+                </a:tc>
+                <a:tc>
+                  <a:txBody>
+                    <a:bodyPr/>
+                    <a:lstStyle/>
+                    <a:p>
+                      <a:pPr algn="ctr"/>
+                      <a:r>
+                        <a:rPr lang="en-US" dirty="0"/>
+                        <a:t>Percentage (%)</a:t>
+                      </a:r>
+                    </a:p>
+                  </a:txBody>
+                  <a:tcPr anchor="ctr"/>
+                </a:tc>
+                <a:tc>
+                  <a:txBody>
+                    <a:bodyPr/>
+                    <a:lstStyle/>
+                    <a:p>
+                      <a:pPr algn="ctr"/>
+                      <a:r>
+                        <a:rPr lang="en-US" dirty="0"/>
+                        <a:t>85</a:t>
+                      </a:r>
+                    </a:p>
+                  </a:txBody>
+                  <a:tcPr anchor="ctr"/>
+                </a:tc>
+                <a:tc>
+                  <a:txBody>
+                    <a:bodyPr/>
+                    <a:lstStyle/>
+                    <a:p>
+                      <a:pPr algn="ctr"/>
+                      <a:r>
+                        <a:rPr lang="en-US" dirty="0"/>
+                        <a:t>88</a:t>
+                      </a:r>
+                    </a:p>
+                  </a:txBody>
+                  <a:tcPr anchor="ctr"/>
+                </a:tc>
+                <a:extLst>
+                  <a:ext uri="{0D108BD9-81ED-4DB2-BD59-A6C34878D82A}">
+                    <a16:rowId xmlns:a16="http://schemas.microsoft.com/office/drawing/2014/main" val="3873867931"/>
+                  </a:ext>
+                </a:extLst>
+              </a:tr>
+              <a:tr h="531843">
+                <a:tc>
+                  <a:txBody>
+                    <a:bodyPr/>
+                    <a:lstStyle/>
+                    <a:p>
+                      <a:pPr algn="ctr"/>
+                      <a:r>
+                        <a:rPr lang="en-US" dirty="0"/>
+                        <a:t>Knowledge retention</a:t>
+                      </a:r>
+                    </a:p>
+                  </a:txBody>
+                  <a:tcPr anchor="ctr"/>
+                </a:tc>
+                <a:tc>
+                  <a:txBody>
+                    <a:bodyPr/>
+                    <a:lstStyle/>
+                    <a:p>
+                      <a:pPr algn="ctr"/>
+                      <a:r>
+                        <a:rPr lang="en-US" dirty="0"/>
+                        <a:t>Percentage (%)</a:t>
+                      </a:r>
+                    </a:p>
+                  </a:txBody>
+                  <a:tcPr anchor="ctr"/>
+                </a:tc>
+                <a:tc>
+                  <a:txBody>
+                    <a:bodyPr/>
+                    <a:lstStyle/>
+                    <a:p>
+                      <a:pPr algn="ctr"/>
+                      <a:r>
+                        <a:rPr lang="en-US" dirty="0"/>
+                        <a:t>75</a:t>
+                      </a:r>
+                    </a:p>
+                  </a:txBody>
+                  <a:tcPr anchor="ctr"/>
+                </a:tc>
+                <a:tc>
+                  <a:txBody>
+                    <a:bodyPr/>
+                    <a:lstStyle/>
+                    <a:p>
+                      <a:pPr algn="ctr"/>
+                      <a:r>
+                        <a:rPr lang="en-US" dirty="0"/>
+                        <a:t>80</a:t>
+                      </a:r>
+                    </a:p>
+                  </a:txBody>
+                  <a:tcPr anchor="ctr"/>
+                </a:tc>
+                <a:extLst>
+                  <a:ext uri="{0D108BD9-81ED-4DB2-BD59-A6C34878D82A}">
+                    <a16:rowId xmlns:a16="http://schemas.microsoft.com/office/drawing/2014/main" val="85209771"/>
+                  </a:ext>
+                </a:extLst>
+              </a:tr>
+              <a:tr h="531843">
+                <a:tc>
+                  <a:txBody>
+                    <a:bodyPr/>
+                    <a:lstStyle/>
+                    <a:p>
+                      <a:pPr algn="ctr"/>
+                      <a:r>
+                        <a:rPr lang="en-US" dirty="0"/>
+                        <a:t>Post-presentation surveys</a:t>
+                      </a:r>
+                    </a:p>
+                  </a:txBody>
+                  <a:tcPr anchor="ctr"/>
+                </a:tc>
+                <a:tc>
+                  <a:txBody>
+                    <a:bodyPr/>
+                    <a:lstStyle/>
+                    <a:p>
+                      <a:pPr algn="ctr"/>
+                      <a:r>
+                        <a:rPr lang="en-US" dirty="0"/>
+                        <a:t>Average rating</a:t>
+                      </a:r>
+                    </a:p>
+                  </a:txBody>
+                  <a:tcPr anchor="ctr"/>
+                </a:tc>
+                <a:tc>
+                  <a:txBody>
+                    <a:bodyPr/>
+                    <a:lstStyle/>
+                    <a:p>
+                      <a:pPr algn="ctr"/>
+                      <a:r>
+                        <a:rPr lang="en-US" dirty="0"/>
+                        <a:t>4.2</a:t>
+                      </a:r>
+                    </a:p>
+                  </a:txBody>
+                  <a:tcPr anchor="ctr"/>
+                </a:tc>
+                <a:tc>
+                  <a:txBody>
+                    <a:bodyPr/>
+                    <a:lstStyle/>
+                    <a:p>
+                      <a:pPr algn="ctr"/>
+                      <a:r>
+                        <a:rPr lang="en-US" dirty="0"/>
+                        <a:t>4.5</a:t>
+                      </a:r>
+                    </a:p>
+                  </a:txBody>
+                  <a:tcPr anchor="ctr"/>
+                </a:tc>
+                <a:extLst>
+                  <a:ext uri="{0D108BD9-81ED-4DB2-BD59-A6C34878D82A}">
+                    <a16:rowId xmlns:a16="http://schemas.microsoft.com/office/drawing/2014/main" val="4061031278"/>
+                  </a:ext>
+                </a:extLst>
+              </a:tr>
+              <a:tr h="531843">
+                <a:tc>
+                  <a:txBody>
+                    <a:bodyPr/>
+                    <a:lstStyle/>
+                    <a:p>
+                      <a:pPr algn="ctr"/>
+                      <a:r>
+                        <a:rPr lang="en-US" dirty="0"/>
+                        <a:t>Referral rate</a:t>
+                      </a:r>
+                    </a:p>
+                  </a:txBody>
+                  <a:tcPr anchor="ctr"/>
+                </a:tc>
+                <a:tc>
+                  <a:txBody>
+                    <a:bodyPr/>
+                    <a:lstStyle/>
+                    <a:p>
+                      <a:pPr algn="ctr"/>
+                      <a:r>
+                        <a:rPr lang="en-US" dirty="0"/>
+                        <a:t>Percentage (%)</a:t>
+                      </a:r>
+                    </a:p>
+                  </a:txBody>
+                  <a:tcPr anchor="ctr"/>
+                </a:tc>
+                <a:tc>
+                  <a:txBody>
+                    <a:bodyPr/>
+                    <a:lstStyle/>
+                    <a:p>
+                      <a:pPr algn="ctr"/>
+                      <a:r>
+                        <a:rPr lang="en-US" dirty="0"/>
+                        <a:t>10</a:t>
+                      </a:r>
+                    </a:p>
+                  </a:txBody>
+                  <a:tcPr anchor="ctr"/>
+                </a:tc>
+                <a:tc>
+                  <a:txBody>
+                    <a:bodyPr/>
+                    <a:lstStyle/>
+                    <a:p>
+                      <a:pPr algn="ctr"/>
+                      <a:r>
+                        <a:rPr lang="en-US" dirty="0"/>
+                        <a:t>12</a:t>
+                      </a:r>
+                    </a:p>
+                  </a:txBody>
+                  <a:tcPr anchor="ctr"/>
+                </a:tc>
+                <a:extLst>
+                  <a:ext uri="{0D108BD9-81ED-4DB2-BD59-A6C34878D82A}">
+                    <a16:rowId xmlns:a16="http://schemas.microsoft.com/office/drawing/2014/main" val="3591840781"/>
+                  </a:ext>
+                </a:extLst>
+              </a:tr>
+              <a:tr h="710249">
+                <a:tc>
+                  <a:txBody>
+                    <a:bodyPr/>
+                    <a:lstStyle/>
+                    <a:p>
+                      <a:pPr algn="ctr"/>
+                      <a:r>
+                        <a:rPr lang="en-US" dirty="0"/>
+                        <a:t>Collaboration opportunities</a:t>
+                      </a:r>
+                    </a:p>
+                  </a:txBody>
+                  <a:tcPr anchor="ctr"/>
+                </a:tc>
+                <a:tc>
+                  <a:txBody>
+                    <a:bodyPr/>
+                    <a:lstStyle/>
+                    <a:p>
+                      <a:pPr algn="ctr"/>
+                      <a:r>
+                        <a:rPr lang="en-US" dirty="0"/>
+                        <a:t># of opportunities</a:t>
+                      </a:r>
+                    </a:p>
+                  </a:txBody>
+                  <a:tcPr anchor="ctr"/>
+                </a:tc>
+                <a:tc>
+                  <a:txBody>
+                    <a:bodyPr/>
+                    <a:lstStyle/>
+                    <a:p>
+                      <a:pPr algn="ctr"/>
+                      <a:r>
+                        <a:rPr lang="en-US" dirty="0"/>
+                        <a:t>8</a:t>
+                      </a:r>
+                    </a:p>
+                  </a:txBody>
+                  <a:tcPr anchor="ctr"/>
+                </a:tc>
+                <a:tc>
+                  <a:txBody>
+                    <a:bodyPr/>
+                    <a:lstStyle/>
+                    <a:p>
+                      <a:pPr algn="ctr"/>
+                      <a:r>
+                        <a:rPr lang="en-US" dirty="0"/>
+                        <a:t>10</a:t>
+                      </a:r>
+                    </a:p>
+                  </a:txBody>
+                  <a:tcPr anchor="ctr"/>
+                </a:tc>
+                <a:extLst>
+                  <a:ext uri="{0D108BD9-81ED-4DB2-BD59-A6C34878D82A}">
+                    <a16:rowId xmlns:a16="http://schemas.microsoft.com/office/drawing/2014/main" val="335389741"/>
+                  </a:ext>
+                </a:extLst>
+              </a:tr>
+            </a:tbl>
+          </a:graphicData>
+        </a:graphic>
+      </p:graphicFrame>
+      <p:sp>
+        <p:nvSpPr>
+          <p:cNvPr id="5" name="Slide Number Placeholder 5">
+            <a:extLst>
+              <a:ext uri="{FF2B5EF4-FFF2-40B4-BE49-F238E27FC236}">
+                <a16:creationId xmlns:a16="http://schemas.microsoft.com/office/drawing/2014/main" id="{4832B776-E386-1CF9-CC8F-2D2FF3EA7066}"/>
+              </a:ext>
+            </a:extLst>
+          </p:cNvPr>
+          <p:cNvSpPr>
+            <a:spLocks noGrp="1"/>
+          </p:cNvSpPr>
+          <p:nvPr>
+            <p:ph type="sldNum" sz="quarter" idx="12"/>
+          </p:nvPr>
+        </p:nvSpPr>
+        <p:spPr>
+          <a:xfrm>
+            <a:off x="10373350" y="6356349"/>
+            <a:ext cx="987552" cy="365125"/>
+          </a:xfrm>
+        </p:spPr>
+        <p:txBody>
+          <a:bodyPr/>
+          <a:lstStyle/>
+          <a:p>
+            <a:fld id="{A49DFD55-3C28-40EF-9E31-A92D2E4017FF}" type="slidenum">
+              <a:rPr lang="en-US" smtClean="0"/>
+              <a:pPr/>
+              <a:t>10</a:t>
+            </a:fld>
+            <a:endParaRPr lang="en-US" dirty="0"/>
+          </a:p>
+        </p:txBody>
+      </p:sp>
+    </p:spTree>
+    <p:extLst>
+      <p:ext uri="{BB962C8B-B14F-4D97-AF65-F5344CB8AC3E}">
+        <p14:creationId xmlns:p14="http://schemas.microsoft.com/office/powerpoint/2010/main" val="2791821786"/>
+      </p:ext>
+    </p:extLst>
+  </p:cSld>
+  <p:clrMapOvr>
+    <a:masterClrMapping/>
+  </p:clrMapOvr>
+</p:sld>
+</file>
+
+<file path=ppt/slides/slide11.xml><?xml version="1.0" encoding="utf-8"?>
+<p:sld xmlns:a="http://schemas.openxmlformats.org/drawingml/2006/main" xmlns:r="http://schemas.openxmlformats.org/officeDocument/2006/relationships" xmlns:p="http://schemas.openxmlformats.org/presentationml/2006/main">
+  <p:cSld>
+    <p:spTree>
+      <p:nvGrpSpPr>
+        <p:cNvPr id="1" name=""/>
+        <p:cNvGrpSpPr/>
+        <p:nvPr/>
+      </p:nvGrpSpPr>
+      <p:grpSpPr>
+        <a:xfrm>
+          <a:off x="0" y="0"/>
+          <a:ext cx="0" cy="0"/>
+          <a:chOff x="0" y="0"/>
+          <a:chExt cx="0" cy="0"/>
+        </a:xfrm>
+      </p:grpSpPr>
+      <p:sp>
+        <p:nvSpPr>
+          <p:cNvPr id="2" name="Title 1">
+            <a:extLst>
+              <a:ext uri="{FF2B5EF4-FFF2-40B4-BE49-F238E27FC236}">
+                <a16:creationId xmlns:a16="http://schemas.microsoft.com/office/drawing/2014/main" id="{8BDF1EDE-5423-435C-B149-87AB1BC22B83}"/>
+              </a:ext>
+            </a:extLst>
+          </p:cNvPr>
+          <p:cNvSpPr>
+            <a:spLocks noGrp="1"/>
+          </p:cNvSpPr>
+          <p:nvPr>
+            <p:ph type="ctrTitle"/>
+          </p:nvPr>
+        </p:nvSpPr>
+        <p:spPr>
+          <a:xfrm>
+            <a:off x="4267200" y="1615736"/>
+            <a:ext cx="4179570" cy="1524735"/>
+          </a:xfrm>
+        </p:spPr>
+        <p:txBody>
+          <a:bodyPr/>
+          <a:lstStyle/>
+          <a:p>
+            <a:r>
+              <a:rPr lang="en-US" dirty="0"/>
+              <a:t>THANK YOU</a:t>
+            </a:r>
+          </a:p>
+        </p:txBody>
+      </p:sp>
+      <p:sp>
+        <p:nvSpPr>
+          <p:cNvPr id="6" name="Slide Number Placeholder 5">
+            <a:extLst>
+              <a:ext uri="{FF2B5EF4-FFF2-40B4-BE49-F238E27FC236}">
+                <a16:creationId xmlns:a16="http://schemas.microsoft.com/office/drawing/2014/main" id="{4C127D99-645F-4FCF-9573-FDFE2A344FA9}"/>
+              </a:ext>
+            </a:extLst>
+          </p:cNvPr>
+          <p:cNvSpPr>
+            <a:spLocks noGrp="1"/>
+          </p:cNvSpPr>
+          <p:nvPr>
+            <p:ph type="sldNum" sz="quarter" idx="12"/>
+          </p:nvPr>
+        </p:nvSpPr>
+        <p:spPr>
+          <a:xfrm>
+            <a:off x="9579428" y="6356350"/>
+            <a:ext cx="1774371" cy="365125"/>
+          </a:xfrm>
+        </p:spPr>
+        <p:txBody>
+          <a:bodyPr/>
+          <a:lstStyle/>
+          <a:p>
+            <a:fld id="{A49DFD55-3C28-40EF-9E31-A92D2E4017FF}" type="slidenum">
+              <a:rPr lang="en-US" smtClean="0"/>
+              <a:pPr/>
+              <a:t>11</a:t>
+            </a:fld>
+            <a:endParaRPr lang="en-US" dirty="0"/>
+          </a:p>
+        </p:txBody>
+      </p:sp>
+    </p:spTree>
+    <p:extLst>
+      <p:ext uri="{BB962C8B-B14F-4D97-AF65-F5344CB8AC3E}">
+        <p14:creationId xmlns:p14="http://schemas.microsoft.com/office/powerpoint/2010/main" val="1969787568"/>
+      </p:ext>
+    </p:extLst>
+  </p:cSld>
+  <p:clrMapOvr>
+    <a:masterClrMapping/>
+  </p:clrMapOvr>
+</p:sld>
+</file>
+
+<file path=ppt/slides/slide2.xml><?xml version="1.0" encoding="utf-8"?>
+<p:sld xmlns:a="http://schemas.openxmlformats.org/drawingml/2006/main" xmlns:r="http://schemas.openxmlformats.org/officeDocument/2006/relationships" xmlns:p="http://schemas.openxmlformats.org/presentationml/2006/main">
+  <p:cSld>
+    <p:spTree>
+      <p:nvGrpSpPr>
+        <p:cNvPr id="1" name=""/>
+        <p:cNvGrpSpPr/>
+        <p:nvPr/>
+      </p:nvGrpSpPr>
+      <p:grpSpPr>
+        <a:xfrm>
+          <a:off x="0" y="0"/>
+          <a:ext cx="0" cy="0"/>
+          <a:chOff x="0" y="0"/>
+          <a:chExt cx="0" cy="0"/>
+        </a:xfrm>
+      </p:grpSpPr>
+      <p:sp>
+        <p:nvSpPr>
+          <p:cNvPr id="2" name="Title 1">
+            <a:extLst>
+              <a:ext uri="{FF2B5EF4-FFF2-40B4-BE49-F238E27FC236}">
+                <a16:creationId xmlns:a16="http://schemas.microsoft.com/office/drawing/2014/main" id="{1BEF5859-10C9-4588-9727-B9362E26C29D}"/>
+              </a:ext>
+            </a:extLst>
+          </p:cNvPr>
+          <p:cNvSpPr>
+            <a:spLocks noGrp="1"/>
+          </p:cNvSpPr>
+          <p:nvPr>
+            <p:ph type="title"/>
+          </p:nvPr>
+        </p:nvSpPr>
+        <p:spPr>
+          <a:xfrm>
+            <a:off x="1333500" y="1020445"/>
+            <a:ext cx="2895600" cy="1325563"/>
+          </a:xfrm>
+        </p:spPr>
+        <p:txBody>
+          <a:bodyPr/>
+          <a:lstStyle/>
+          <a:p>
+            <a:r>
+              <a:rPr lang="en-US" dirty="0"/>
+              <a:t>AGENDA</a:t>
+            </a:r>
+          </a:p>
+        </p:txBody>
+      </p:sp>
+      <p:sp>
+        <p:nvSpPr>
+          <p:cNvPr id="3" name="Content Placeholder 2">
+            <a:extLst>
+              <a:ext uri="{FF2B5EF4-FFF2-40B4-BE49-F238E27FC236}">
+                <a16:creationId xmlns:a16="http://schemas.microsoft.com/office/drawing/2014/main" id="{5671D7E5-EF66-4BCD-8DAA-E9061157F0BE}"/>
+              </a:ext>
+            </a:extLst>
+          </p:cNvPr>
+          <p:cNvSpPr>
+            <a:spLocks noGrp="1"/>
+          </p:cNvSpPr>
+          <p:nvPr>
+            <p:ph idx="1"/>
+          </p:nvPr>
+        </p:nvSpPr>
+        <p:spPr>
+          <a:xfrm>
+            <a:off x="1333499" y="2674013"/>
+            <a:ext cx="3047253" cy="3269589"/>
+          </a:xfrm>
+        </p:spPr>
+        <p:txBody>
+          <a:bodyPr>
+            <a:normAutofit/>
+          </a:bodyPr>
+          <a:lstStyle/>
+          <a:p>
+            <a:r>
+              <a:rPr lang="en-DK" dirty="0"/>
+              <a:t>Project Introduction</a:t>
+            </a:r>
+            <a:endParaRPr lang="en-US" dirty="0"/>
+          </a:p>
+          <a:p>
+            <a:r>
+              <a:rPr lang="en-DK" dirty="0"/>
+              <a:t>Data and Pipeline Overview</a:t>
+            </a:r>
+            <a:endParaRPr lang="en-US" dirty="0"/>
+          </a:p>
+          <a:p>
+            <a:r>
+              <a:rPr lang="en-DK" dirty="0"/>
+              <a:t>DBT Snowflake Setup</a:t>
+            </a:r>
+            <a:endParaRPr lang="en-US" dirty="0"/>
+          </a:p>
+          <a:p>
+            <a:r>
+              <a:rPr lang="en-DK" dirty="0"/>
+              <a:t>Data modelling layers</a:t>
+            </a:r>
+          </a:p>
+          <a:p>
+            <a:r>
+              <a:rPr lang="en-DK" dirty="0"/>
+              <a:t>BI and Insights </a:t>
+            </a:r>
+          </a:p>
+          <a:p>
+            <a:r>
+              <a:rPr lang="en-DK" dirty="0"/>
+              <a:t>Summary and Questions</a:t>
+            </a:r>
+          </a:p>
+        </p:txBody>
+      </p:sp>
+      <p:sp>
+        <p:nvSpPr>
+          <p:cNvPr id="5" name="Slide Number Placeholder 5">
+            <a:extLst>
+              <a:ext uri="{FF2B5EF4-FFF2-40B4-BE49-F238E27FC236}">
+                <a16:creationId xmlns:a16="http://schemas.microsoft.com/office/drawing/2014/main" id="{B02A8827-B1A1-2D2F-D6DD-E886B886C43E}"/>
+              </a:ext>
+            </a:extLst>
+          </p:cNvPr>
+          <p:cNvSpPr>
+            <a:spLocks noGrp="1"/>
+          </p:cNvSpPr>
+          <p:nvPr>
+            <p:ph type="sldNum" sz="quarter" idx="12"/>
+          </p:nvPr>
+        </p:nvSpPr>
+        <p:spPr>
+          <a:xfrm>
+            <a:off x="10373350" y="6356349"/>
+            <a:ext cx="987552" cy="365125"/>
+          </a:xfrm>
+        </p:spPr>
+        <p:txBody>
+          <a:bodyPr/>
+          <a:lstStyle/>
+          <a:p>
+            <a:fld id="{A49DFD55-3C28-40EF-9E31-A92D2E4017FF}" type="slidenum">
+              <a:rPr lang="en-US" smtClean="0"/>
+              <a:pPr/>
+              <a:t>2</a:t>
+            </a:fld>
+            <a:endParaRPr lang="en-US" dirty="0"/>
+          </a:p>
+        </p:txBody>
+      </p:sp>
+    </p:spTree>
+    <p:extLst>
+      <p:ext uri="{BB962C8B-B14F-4D97-AF65-F5344CB8AC3E}">
+        <p14:creationId xmlns:p14="http://schemas.microsoft.com/office/powerpoint/2010/main" val="1713219598"/>
+      </p:ext>
+    </p:extLst>
+  </p:cSld>
+  <p:clrMapOvr>
+    <a:masterClrMapping/>
+  </p:clrMapOvr>
+</p:sld>
+</file>
+
+<file path=ppt/slides/slide3.xml><?xml version="1.0" encoding="utf-8"?>
+<p:sld xmlns:a="http://schemas.openxmlformats.org/drawingml/2006/main" xmlns:r="http://schemas.openxmlformats.org/officeDocument/2006/relationships" xmlns:p="http://schemas.openxmlformats.org/presentationml/2006/main">
+  <p:cSld>
+    <p:spTree>
+      <p:nvGrpSpPr>
+        <p:cNvPr id="1" name=""/>
+        <p:cNvGrpSpPr/>
+        <p:nvPr/>
+      </p:nvGrpSpPr>
+      <p:grpSpPr>
+        <a:xfrm>
+          <a:off x="0" y="0"/>
+          <a:ext cx="0" cy="0"/>
+          <a:chOff x="0" y="0"/>
+          <a:chExt cx="0" cy="0"/>
+        </a:xfrm>
+      </p:grpSpPr>
+      <p:sp>
+        <p:nvSpPr>
+          <p:cNvPr id="2" name="Title 1">
+            <a:extLst>
+              <a:ext uri="{FF2B5EF4-FFF2-40B4-BE49-F238E27FC236}">
+                <a16:creationId xmlns:a16="http://schemas.microsoft.com/office/drawing/2014/main" id="{9528DBD1-DB29-D44F-FD5A-3071BB37EF37}"/>
+              </a:ext>
+            </a:extLst>
+          </p:cNvPr>
+          <p:cNvSpPr>
+            <a:spLocks noGrp="1"/>
+          </p:cNvSpPr>
+          <p:nvPr>
+            <p:ph type="ctrTitle"/>
+          </p:nvPr>
+        </p:nvSpPr>
+        <p:spPr>
+          <a:xfrm>
+            <a:off x="6574118" y="1371535"/>
+            <a:ext cx="5259293" cy="3377354"/>
+          </a:xfrm>
+        </p:spPr>
+        <p:txBody>
+          <a:bodyPr/>
+          <a:lstStyle/>
+          <a:p>
+            <a:r>
+              <a:rPr lang="en-DK" dirty="0"/>
+              <a:t>Amazon E-commerce and Macroeconomic insight in the US (2018-2022)</a:t>
+            </a:r>
+            <a:endParaRPr lang="en-US" dirty="0"/>
+          </a:p>
+        </p:txBody>
+      </p:sp>
+    </p:spTree>
+    <p:extLst>
+      <p:ext uri="{BB962C8B-B14F-4D97-AF65-F5344CB8AC3E}">
+        <p14:creationId xmlns:p14="http://schemas.microsoft.com/office/powerpoint/2010/main" val="608796113"/>
+      </p:ext>
+    </p:extLst>
+  </p:cSld>
+  <p:clrMapOvr>
+    <a:masterClrMapping/>
+  </p:clrMapOvr>
+</p:sld>
+</file>
+
+<file path=ppt/slides/slide4.xml><?xml version="1.0" encoding="utf-8"?>
+<p:sld xmlns:a="http://schemas.openxmlformats.org/drawingml/2006/main" xmlns:r="http://schemas.openxmlformats.org/officeDocument/2006/relationships" xmlns:p="http://schemas.openxmlformats.org/presentationml/2006/main">
+  <p:cSld>
+    <p:spTree>
+      <p:nvGrpSpPr>
+        <p:cNvPr id="1" name=""/>
+        <p:cNvGrpSpPr/>
+        <p:nvPr/>
+      </p:nvGrpSpPr>
+      <p:grpSpPr>
+        <a:xfrm>
+          <a:off x="0" y="0"/>
+          <a:ext cx="0" cy="0"/>
+          <a:chOff x="0" y="0"/>
+          <a:chExt cx="0" cy="0"/>
+        </a:xfrm>
+      </p:grpSpPr>
+      <p:sp>
+        <p:nvSpPr>
+          <p:cNvPr id="2" name="Title 1">
+            <a:extLst>
+              <a:ext uri="{FF2B5EF4-FFF2-40B4-BE49-F238E27FC236}">
+                <a16:creationId xmlns:a16="http://schemas.microsoft.com/office/drawing/2014/main" id="{0A32731C-311B-46F7-A865-6C3AF6B09A47}"/>
+              </a:ext>
+            </a:extLst>
+          </p:cNvPr>
+          <p:cNvSpPr>
+            <a:spLocks noGrp="1"/>
+          </p:cNvSpPr>
+          <p:nvPr>
+            <p:ph type="title"/>
+          </p:nvPr>
+        </p:nvSpPr>
+        <p:spPr>
+          <a:xfrm>
+            <a:off x="1322318" y="-180975"/>
+            <a:ext cx="7288282" cy="873146"/>
+          </a:xfrm>
+        </p:spPr>
+        <p:txBody>
+          <a:bodyPr/>
+          <a:lstStyle/>
+          <a:p>
+            <a:r>
+              <a:rPr lang="en-DK" dirty="0"/>
+              <a:t>project introduction</a:t>
+            </a:r>
+            <a:endParaRPr lang="en-US" dirty="0"/>
+          </a:p>
+        </p:txBody>
+      </p:sp>
+      <p:sp>
+        <p:nvSpPr>
+          <p:cNvPr id="3" name="Text Placeholder 2">
+            <a:extLst>
+              <a:ext uri="{FF2B5EF4-FFF2-40B4-BE49-F238E27FC236}">
+                <a16:creationId xmlns:a16="http://schemas.microsoft.com/office/drawing/2014/main" id="{9D5232F9-FD00-464A-9F17-619C91AEF8F3}"/>
+              </a:ext>
+            </a:extLst>
+          </p:cNvPr>
+          <p:cNvSpPr>
+            <a:spLocks noGrp="1"/>
+          </p:cNvSpPr>
+          <p:nvPr>
+            <p:ph sz="half" idx="2"/>
+          </p:nvPr>
+        </p:nvSpPr>
+        <p:spPr>
+          <a:xfrm>
+            <a:off x="1398518" y="873146"/>
+            <a:ext cx="6402457" cy="5433651"/>
+          </a:xfrm>
+        </p:spPr>
+        <p:txBody>
+          <a:bodyPr>
+            <a:normAutofit lnSpcReduction="10000"/>
+          </a:bodyPr>
+          <a:lstStyle/>
+          <a:p>
+            <a:pPr marL="0" lvl="1" indent="0">
+              <a:buNone/>
+            </a:pPr>
+            <a:r>
+              <a:rPr lang="en-DK" dirty="0"/>
+              <a:t>Project goal:</a:t>
+            </a:r>
+          </a:p>
+          <a:p>
+            <a:pPr marL="285750" lvl="1"/>
+            <a:r>
+              <a:rPr lang="en-US" dirty="0"/>
+              <a:t>Transform raw data into a unified analytical model to explore consumer spending behavior and macroeconomic performance across U.S. states.</a:t>
+            </a:r>
+            <a:endParaRPr lang="en-DK" dirty="0"/>
+          </a:p>
+          <a:p>
+            <a:pPr marL="0" lvl="1" indent="0">
+              <a:buNone/>
+            </a:pPr>
+            <a:r>
+              <a:rPr lang="en-DK" dirty="0"/>
+              <a:t>Data:</a:t>
+            </a:r>
+          </a:p>
+          <a:p>
+            <a:pPr marL="285750" lvl="1"/>
+            <a:r>
+              <a:rPr lang="en-US" i="1" dirty="0"/>
+              <a:t>FRED Economic Data</a:t>
+            </a:r>
+            <a:r>
+              <a:rPr lang="en-US" dirty="0"/>
+              <a:t> </a:t>
+            </a:r>
+            <a:r>
+              <a:rPr lang="en-DK" dirty="0"/>
+              <a:t>- </a:t>
+            </a:r>
+            <a:r>
+              <a:rPr lang="en-US" dirty="0"/>
+              <a:t>Monthly and state-level indicators (CPI, income, unemployment, consumer sentiment, etc.).</a:t>
+            </a:r>
+            <a:endParaRPr lang="en-DK" dirty="0"/>
+          </a:p>
+          <a:p>
+            <a:pPr marL="285750" lvl="1"/>
+            <a:r>
+              <a:rPr lang="en-US" i="1" dirty="0"/>
+              <a:t>Open E-commerce 1.0 (MIT Media Lab)</a:t>
+            </a:r>
+            <a:r>
+              <a:rPr lang="en-DK" i="1" dirty="0"/>
+              <a:t> -</a:t>
+            </a:r>
+            <a:r>
+              <a:rPr lang="en-US" dirty="0"/>
+              <a:t> 1.8M U.S. Amazon purchases (2018–2022) linked with user demographics.</a:t>
+            </a:r>
+            <a:endParaRPr lang="en-DK" dirty="0"/>
+          </a:p>
+          <a:p>
+            <a:pPr marL="0" lvl="1" indent="0">
+              <a:buNone/>
+            </a:pPr>
+            <a:r>
+              <a:rPr lang="en-US" dirty="0"/>
+              <a:t>Core Tasks:</a:t>
+            </a:r>
+            <a:endParaRPr lang="en-DK" dirty="0"/>
+          </a:p>
+          <a:p>
+            <a:pPr marL="285750" lvl="1"/>
+            <a:r>
+              <a:rPr lang="en-US" dirty="0"/>
+              <a:t>Load data into Snowflake and design raw → staging → intermediate → marts layers.</a:t>
+            </a:r>
+            <a:endParaRPr lang="en-DK" dirty="0"/>
+          </a:p>
+          <a:p>
+            <a:pPr marL="285750" lvl="1"/>
+            <a:r>
+              <a:rPr lang="en-US" dirty="0"/>
+              <a:t>Build </a:t>
+            </a:r>
+            <a:r>
+              <a:rPr lang="en-DK" dirty="0"/>
+              <a:t>robust </a:t>
+            </a:r>
+            <a:r>
+              <a:rPr lang="en-US" dirty="0" err="1"/>
+              <a:t>dbt</a:t>
+            </a:r>
+            <a:r>
+              <a:rPr lang="en-US" dirty="0"/>
+              <a:t> transformations with documentation and data tests.</a:t>
+            </a:r>
+            <a:endParaRPr lang="en-DK" dirty="0"/>
+          </a:p>
+          <a:p>
+            <a:pPr marL="285750" lvl="1"/>
+            <a:r>
+              <a:rPr lang="en-US" dirty="0"/>
+              <a:t>Model aggregated state-level performance metrics (spend, CPI, unemployment).</a:t>
+            </a:r>
+            <a:endParaRPr lang="en-DK" dirty="0"/>
+          </a:p>
+          <a:p>
+            <a:pPr marL="285750" lvl="1"/>
+            <a:r>
+              <a:rPr lang="en-US" dirty="0"/>
+              <a:t>Prepare outputs optimized for Power BI dashboards.</a:t>
+            </a:r>
+            <a:endParaRPr lang="en-DK" dirty="0"/>
+          </a:p>
+          <a:p>
+            <a:pPr marL="285750" lvl="1"/>
+            <a:endParaRPr lang="en-DK" dirty="0"/>
+          </a:p>
+          <a:p>
+            <a:pPr marL="285750" lvl="1"/>
+            <a:endParaRPr lang="en-DK" dirty="0"/>
+          </a:p>
+          <a:p>
+            <a:pPr marL="285750" lvl="1"/>
+            <a:endParaRPr lang="en-DK" dirty="0"/>
+          </a:p>
+          <a:p>
+            <a:pPr marL="285750" lvl="1"/>
+            <a:endParaRPr lang="en-DK" dirty="0"/>
+          </a:p>
+          <a:p>
+            <a:pPr marL="0" lvl="1" indent="0">
+              <a:buNone/>
+            </a:pPr>
+            <a:endParaRPr lang="en-DK" dirty="0"/>
+          </a:p>
+          <a:p>
+            <a:pPr lvl="1"/>
+            <a:endParaRPr lang="en-DK" dirty="0"/>
+          </a:p>
+          <a:p>
+            <a:pPr lvl="1"/>
+            <a:endParaRPr lang="en-DK" dirty="0"/>
+          </a:p>
+          <a:p>
+            <a:pPr lvl="1"/>
+            <a:endParaRPr lang="en-DK" dirty="0"/>
+          </a:p>
+          <a:p>
+            <a:pPr lvl="1"/>
+            <a:endParaRPr lang="en-DK" dirty="0"/>
+          </a:p>
+          <a:p>
+            <a:pPr lvl="1"/>
+            <a:endParaRPr lang="en-DK" dirty="0"/>
+          </a:p>
+          <a:p>
+            <a:pPr lvl="1"/>
+            <a:endParaRPr lang="en-DK" dirty="0"/>
+          </a:p>
+        </p:txBody>
+      </p:sp>
+      <p:sp>
+        <p:nvSpPr>
+          <p:cNvPr id="14" name="Slide Number Placeholder 5">
+            <a:extLst>
+              <a:ext uri="{FF2B5EF4-FFF2-40B4-BE49-F238E27FC236}">
+                <a16:creationId xmlns:a16="http://schemas.microsoft.com/office/drawing/2014/main" id="{ECE635A2-70B8-3EAB-6A18-952B02EBAA1E}"/>
+              </a:ext>
+            </a:extLst>
+          </p:cNvPr>
+          <p:cNvSpPr>
+            <a:spLocks noGrp="1"/>
+          </p:cNvSpPr>
+          <p:nvPr>
+            <p:ph type="sldNum" sz="quarter" idx="12"/>
+          </p:nvPr>
+        </p:nvSpPr>
+        <p:spPr>
+          <a:xfrm>
+            <a:off x="10373350" y="6356349"/>
+            <a:ext cx="987552" cy="365125"/>
+          </a:xfrm>
+        </p:spPr>
+        <p:txBody>
+          <a:bodyPr/>
+          <a:lstStyle/>
+          <a:p>
+            <a:fld id="{A49DFD55-3C28-40EF-9E31-A92D2E4017FF}" type="slidenum">
+              <a:rPr lang="en-US" smtClean="0"/>
+              <a:pPr/>
+              <a:t>4</a:t>
+            </a:fld>
+            <a:endParaRPr lang="en-US" dirty="0"/>
+          </a:p>
+        </p:txBody>
+      </p:sp>
+    </p:spTree>
+    <p:extLst>
+      <p:ext uri="{BB962C8B-B14F-4D97-AF65-F5344CB8AC3E}">
+        <p14:creationId xmlns:p14="http://schemas.microsoft.com/office/powerpoint/2010/main" val="3571516367"/>
+      </p:ext>
+    </p:extLst>
+  </p:cSld>
+  <p:clrMapOvr>
+    <a:masterClrMapping/>
+  </p:clrMapOvr>
+</p:sld>
+</file>
+
+<file path=ppt/slides/slide5.xml><?xml version="1.0" encoding="utf-8"?>
+<p:sld xmlns:a="http://schemas.openxmlformats.org/drawingml/2006/main" xmlns:r="http://schemas.openxmlformats.org/officeDocument/2006/relationships" xmlns:p="http://schemas.openxmlformats.org/presentationml/2006/main">
+  <p:cSld>
+    <p:spTree>
+      <p:nvGrpSpPr>
+        <p:cNvPr id="1" name=""/>
+        <p:cNvGrpSpPr/>
+        <p:nvPr/>
+      </p:nvGrpSpPr>
+      <p:grpSpPr>
+        <a:xfrm>
+          <a:off x="0" y="0"/>
+          <a:ext cx="0" cy="0"/>
+          <a:chOff x="0" y="0"/>
+          <a:chExt cx="0" cy="0"/>
+        </a:xfrm>
+      </p:grpSpPr>
+      <p:sp>
+        <p:nvSpPr>
+          <p:cNvPr id="2" name="Title 1">
+            <a:extLst>
+              <a:ext uri="{FF2B5EF4-FFF2-40B4-BE49-F238E27FC236}">
+                <a16:creationId xmlns:a16="http://schemas.microsoft.com/office/drawing/2014/main" id="{566C97BE-403B-122E-90D1-2788978A0B6F}"/>
+              </a:ext>
+            </a:extLst>
+          </p:cNvPr>
+          <p:cNvSpPr>
+            <a:spLocks noGrp="1"/>
+          </p:cNvSpPr>
+          <p:nvPr>
+            <p:ph type="ctrTitle"/>
+          </p:nvPr>
+        </p:nvSpPr>
+        <p:spPr>
+          <a:xfrm>
+            <a:off x="6991350" y="406400"/>
+            <a:ext cx="4597026" cy="3457971"/>
+          </a:xfrm>
+        </p:spPr>
+        <p:txBody>
+          <a:bodyPr/>
+          <a:lstStyle/>
+          <a:p>
+            <a:r>
+              <a:rPr lang="en-DK" dirty="0"/>
+              <a:t>pipeline overview</a:t>
+            </a:r>
+            <a:endParaRPr lang="en-US" dirty="0"/>
+          </a:p>
+        </p:txBody>
+      </p:sp>
+    </p:spTree>
+    <p:extLst>
+      <p:ext uri="{BB962C8B-B14F-4D97-AF65-F5344CB8AC3E}">
+        <p14:creationId xmlns:p14="http://schemas.microsoft.com/office/powerpoint/2010/main" val="334696707"/>
+      </p:ext>
+    </p:extLst>
+  </p:cSld>
+  <p:clrMapOvr>
+    <a:masterClrMapping/>
+  </p:clrMapOvr>
+</p:sld>
+</file>
+
+<file path=ppt/slides/slide6.xml><?xml version="1.0" encoding="utf-8"?>
+<p:sld xmlns:a="http://schemas.openxmlformats.org/drawingml/2006/main" xmlns:r="http://schemas.openxmlformats.org/officeDocument/2006/relationships" xmlns:p="http://schemas.openxmlformats.org/presentationml/2006/main">
+  <p:cSld>
+    <p:spTree>
+      <p:nvGrpSpPr>
+        <p:cNvPr id="1" name=""/>
+        <p:cNvGrpSpPr/>
+        <p:nvPr/>
+      </p:nvGrpSpPr>
+      <p:grpSpPr>
+        <a:xfrm>
+          <a:off x="0" y="0"/>
+          <a:ext cx="0" cy="0"/>
+          <a:chOff x="0" y="0"/>
+          <a:chExt cx="0" cy="0"/>
+        </a:xfrm>
+      </p:grpSpPr>
+      <p:sp>
+        <p:nvSpPr>
+          <p:cNvPr id="2" name="Title 1">
+            <a:extLst>
+              <a:ext uri="{FF2B5EF4-FFF2-40B4-BE49-F238E27FC236}">
+                <a16:creationId xmlns:a16="http://schemas.microsoft.com/office/drawing/2014/main" id="{8B27D9B3-B64F-656A-0D99-161A6C0F518F}"/>
+              </a:ext>
+            </a:extLst>
+          </p:cNvPr>
+          <p:cNvSpPr>
+            <a:spLocks noGrp="1"/>
+          </p:cNvSpPr>
+          <p:nvPr>
+            <p:ph type="title"/>
+          </p:nvPr>
+        </p:nvSpPr>
+        <p:spPr>
+          <a:xfrm>
+            <a:off x="151969" y="394447"/>
+            <a:ext cx="9953308" cy="899331"/>
+          </a:xfrm>
+        </p:spPr>
+        <p:txBody>
+          <a:bodyPr/>
+          <a:lstStyle/>
+          <a:p>
+            <a:r>
+              <a:rPr lang="en-DK" dirty="0"/>
+              <a:t>Data pipeline overview</a:t>
+            </a:r>
+            <a:endParaRPr lang="en-US" dirty="0"/>
+          </a:p>
+        </p:txBody>
+      </p:sp>
+      <p:sp>
+        <p:nvSpPr>
+          <p:cNvPr id="68" name="Slide Number Placeholder 67">
+            <a:extLst>
+              <a:ext uri="{FF2B5EF4-FFF2-40B4-BE49-F238E27FC236}">
+                <a16:creationId xmlns:a16="http://schemas.microsoft.com/office/drawing/2014/main" id="{AA0ACADD-CC4E-851C-DA07-C22DB97FA23E}"/>
+              </a:ext>
+            </a:extLst>
+          </p:cNvPr>
+          <p:cNvSpPr>
+            <a:spLocks noGrp="1"/>
+          </p:cNvSpPr>
+          <p:nvPr>
+            <p:ph type="sldNum" sz="quarter" idx="13"/>
+          </p:nvPr>
+        </p:nvSpPr>
+        <p:spPr>
+          <a:xfrm>
+            <a:off x="10373350" y="6356349"/>
+            <a:ext cx="987552" cy="365125"/>
+          </a:xfrm>
+        </p:spPr>
+        <p:txBody>
+          <a:bodyPr/>
+          <a:lstStyle/>
+          <a:p>
+            <a:fld id="{A49DFD55-3C28-40EF-9E31-A92D2E4017FF}" type="slidenum">
+              <a:rPr lang="en-US" smtClean="0"/>
+              <a:pPr/>
+              <a:t>6</a:t>
+            </a:fld>
+            <a:endParaRPr lang="en-US" dirty="0"/>
+          </a:p>
+        </p:txBody>
+      </p:sp>
+      <p:pic>
+        <p:nvPicPr>
+          <p:cNvPr id="17" name="Picture 16" descr="A screen shot of a computer&#10;&#10;AI-generated content may be incorrect.">
+            <a:extLst>
+              <a:ext uri="{FF2B5EF4-FFF2-40B4-BE49-F238E27FC236}">
+                <a16:creationId xmlns:a16="http://schemas.microsoft.com/office/drawing/2014/main" id="{5DADF601-9E05-909F-B0B2-0961ECE3FF01}"/>
+              </a:ext>
+            </a:extLst>
+          </p:cNvPr>
+          <p:cNvPicPr>
+            <a:picLocks noChangeAspect="1"/>
+          </p:cNvPicPr>
+          <p:nvPr/>
+        </p:nvPicPr>
+        <p:blipFill>
+          <a:blip r:embed="rId3"/>
+          <a:stretch>
+            <a:fillRect/>
+          </a:stretch>
+        </p:blipFill>
+        <p:spPr>
+          <a:xfrm>
+            <a:off x="46007" y="1541930"/>
+            <a:ext cx="11224009" cy="4814420"/>
+          </a:xfrm>
+          <a:prstGeom prst="rect">
+            <a:avLst/>
+          </a:prstGeom>
+        </p:spPr>
+      </p:pic>
+    </p:spTree>
+    <p:extLst>
+      <p:ext uri="{BB962C8B-B14F-4D97-AF65-F5344CB8AC3E}">
+        <p14:creationId xmlns:p14="http://schemas.microsoft.com/office/powerpoint/2010/main" val="636929804"/>
+      </p:ext>
+    </p:extLst>
+  </p:cSld>
+  <p:clrMapOvr>
+    <a:masterClrMapping/>
+  </p:clrMapOvr>
+</p:sld>
+</file>
+
+<file path=ppt/slides/slide7.xml><?xml version="1.0" encoding="utf-8"?>
+<p:sld xmlns:a="http://schemas.openxmlformats.org/drawingml/2006/main" xmlns:r="http://schemas.openxmlformats.org/officeDocument/2006/relationships" xmlns:p="http://schemas.openxmlformats.org/presentationml/2006/main">
+  <p:cSld>
+    <p:spTree>
+      <p:nvGrpSpPr>
+        <p:cNvPr id="1" name=""/>
+        <p:cNvGrpSpPr/>
+        <p:nvPr/>
+      </p:nvGrpSpPr>
+      <p:grpSpPr>
+        <a:xfrm>
+          <a:off x="0" y="0"/>
+          <a:ext cx="0" cy="0"/>
+          <a:chOff x="0" y="0"/>
+          <a:chExt cx="0" cy="0"/>
+        </a:xfrm>
+      </p:grpSpPr>
+      <p:sp>
+        <p:nvSpPr>
+          <p:cNvPr id="2" name="Title 1">
+            <a:extLst>
+              <a:ext uri="{FF2B5EF4-FFF2-40B4-BE49-F238E27FC236}">
+                <a16:creationId xmlns:a16="http://schemas.microsoft.com/office/drawing/2014/main" id="{4518FC28-E0BD-4387-B8BE-9965D1A57FF1}"/>
+              </a:ext>
+            </a:extLst>
+          </p:cNvPr>
+          <p:cNvSpPr>
+            <a:spLocks noGrp="1"/>
+          </p:cNvSpPr>
+          <p:nvPr>
+            <p:ph type="title"/>
+          </p:nvPr>
+        </p:nvSpPr>
+        <p:spPr>
+          <a:xfrm>
+            <a:off x="5476874" y="1671639"/>
+            <a:ext cx="5884027" cy="1204912"/>
+          </a:xfrm>
+        </p:spPr>
+        <p:txBody>
+          <a:bodyPr/>
+          <a:lstStyle/>
+          <a:p>
+            <a:r>
+              <a:rPr lang="en-US" dirty="0"/>
+              <a:t>Speaking Impact</a:t>
+            </a:r>
+          </a:p>
+        </p:txBody>
+      </p:sp>
+      <p:pic>
+        <p:nvPicPr>
+          <p:cNvPr id="47" name="Picture Placeholder 46" descr="A person smiling with a shadow on the wall">
+            <a:extLst>
+              <a:ext uri="{FF2B5EF4-FFF2-40B4-BE49-F238E27FC236}">
+                <a16:creationId xmlns:a16="http://schemas.microsoft.com/office/drawing/2014/main" id="{F55BC7A4-EE4B-7EFC-C325-408D66C3CBA7}"/>
+              </a:ext>
+            </a:extLst>
+          </p:cNvPr>
+          <p:cNvPicPr>
+            <a:picLocks noGrp="1" noChangeAspect="1"/>
+          </p:cNvPicPr>
+          <p:nvPr>
+            <p:ph type="pic" sz="quarter" idx="13"/>
+          </p:nvPr>
+        </p:nvPicPr>
+        <p:blipFill>
+          <a:blip r:embed="rId3"/>
+          <a:srcRect l="112" r="112"/>
+          <a:stretch/>
+        </p:blipFill>
+        <p:spPr>
+          <a:xfrm>
+            <a:off x="-28230" y="-9144"/>
+            <a:ext cx="5481955" cy="6876288"/>
+          </a:xfrm>
+        </p:spPr>
+      </p:pic>
+      <p:sp>
+        <p:nvSpPr>
+          <p:cNvPr id="6" name="Slide Number Placeholder 5">
+            <a:extLst>
+              <a:ext uri="{FF2B5EF4-FFF2-40B4-BE49-F238E27FC236}">
+                <a16:creationId xmlns:a16="http://schemas.microsoft.com/office/drawing/2014/main" id="{7C4B8313-9270-4128-8674-3A3E42B806BC}"/>
+              </a:ext>
+            </a:extLst>
+          </p:cNvPr>
+          <p:cNvSpPr>
+            <a:spLocks noGrp="1"/>
+          </p:cNvSpPr>
+          <p:nvPr>
+            <p:ph type="sldNum" sz="quarter" idx="12"/>
+          </p:nvPr>
+        </p:nvSpPr>
+        <p:spPr>
+          <a:xfrm>
+            <a:off x="10373350" y="6356349"/>
+            <a:ext cx="987552" cy="365125"/>
+          </a:xfrm>
+        </p:spPr>
+        <p:txBody>
+          <a:bodyPr/>
+          <a:lstStyle/>
+          <a:p>
+            <a:fld id="{A49DFD55-3C28-40EF-9E31-A92D2E4017FF}" type="slidenum">
+              <a:rPr lang="en-US" smtClean="0"/>
+              <a:pPr/>
+              <a:t>7</a:t>
+            </a:fld>
+            <a:endParaRPr lang="en-US" dirty="0"/>
+          </a:p>
+        </p:txBody>
+      </p:sp>
+      <p:sp>
+        <p:nvSpPr>
+          <p:cNvPr id="3" name="Text Placeholder 2">
+            <a:extLst>
+              <a:ext uri="{FF2B5EF4-FFF2-40B4-BE49-F238E27FC236}">
+                <a16:creationId xmlns:a16="http://schemas.microsoft.com/office/drawing/2014/main" id="{FED19BCA-B61F-4EA6-A1FB-CCA3BD8506FB}"/>
+              </a:ext>
+            </a:extLst>
+          </p:cNvPr>
+          <p:cNvSpPr>
+            <a:spLocks noGrp="1"/>
+          </p:cNvSpPr>
+          <p:nvPr>
+            <p:ph sz="half" idx="14"/>
+          </p:nvPr>
+        </p:nvSpPr>
+        <p:spPr>
+          <a:xfrm>
+            <a:off x="5453725" y="3660774"/>
+            <a:ext cx="5907176" cy="2536826"/>
+          </a:xfrm>
+        </p:spPr>
+        <p:txBody>
+          <a:bodyPr>
+            <a:noAutofit/>
+          </a:bodyPr>
+          <a:lstStyle/>
+          <a:p>
+            <a:r>
+              <a:rPr lang="en-US" dirty="0"/>
+              <a:t>Your ability to communicate effectively will leave a lasting impact on your audience</a:t>
+            </a:r>
+          </a:p>
+          <a:p>
+            <a:r>
+              <a:rPr lang="en-US" dirty="0"/>
+              <a:t>Effectively communicating involves not only delivering a message but also resonating with the experiences, values, and emotions of those listening </a:t>
+            </a:r>
+          </a:p>
+        </p:txBody>
+      </p:sp>
+      <p:cxnSp>
+        <p:nvCxnSpPr>
+          <p:cNvPr id="23" name="Straight Connector 22">
+            <a:extLst>
+              <a:ext uri="{FF2B5EF4-FFF2-40B4-BE49-F238E27FC236}">
+                <a16:creationId xmlns:a16="http://schemas.microsoft.com/office/drawing/2014/main" id="{D87F08D6-2CA7-4A5A-BE34-07113DCA535D}"/>
+              </a:ext>
+              <a:ext uri="{C183D7F6-B498-43B3-948B-1728B52AA6E4}">
+                <adec:decorative xmlns:adec="http://schemas.microsoft.com/office/drawing/2017/decorative" val="1"/>
+              </a:ext>
+            </a:extLst>
+          </p:cNvPr>
+          <p:cNvCxnSpPr>
+            <a:cxnSpLocks/>
+          </p:cNvCxnSpPr>
+          <p:nvPr userDrawn="1"/>
+        </p:nvCxnSpPr>
+        <p:spPr>
+          <a:xfrm flipH="1" flipV="1">
+            <a:off x="0" y="876300"/>
+            <a:ext cx="5246255" cy="1709882"/>
+          </a:xfrm>
+          <a:prstGeom prst="line">
+            <a:avLst/>
+          </a:prstGeom>
+          <a:ln>
+            <a:solidFill>
+              <a:schemeClr val="tx1"/>
+            </a:solidFill>
+          </a:ln>
+        </p:spPr>
+        <p:style>
+          <a:lnRef idx="1">
+            <a:schemeClr val="accent1"/>
+          </a:lnRef>
+          <a:fillRef idx="0">
+            <a:schemeClr val="accent1"/>
+          </a:fillRef>
+          <a:effectRef idx="0">
+            <a:schemeClr val="accent1"/>
+          </a:effectRef>
+          <a:fontRef idx="minor">
+            <a:schemeClr val="tx1"/>
+          </a:fontRef>
+        </p:style>
+      </p:cxnSp>
+    </p:spTree>
+    <p:extLst>
+      <p:ext uri="{BB962C8B-B14F-4D97-AF65-F5344CB8AC3E}">
+        <p14:creationId xmlns:p14="http://schemas.microsoft.com/office/powerpoint/2010/main" val="1742861620"/>
+      </p:ext>
+    </p:extLst>
+  </p:cSld>
+  <p:clrMapOvr>
+    <a:masterClrMapping/>
+  </p:clrMapOvr>
+</p:sld>
+</file>
+
+<file path=ppt/slides/slide8.xml><?xml version="1.0" encoding="utf-8"?>
+<p:sld xmlns:a="http://schemas.openxmlformats.org/drawingml/2006/main" xmlns:r="http://schemas.openxmlformats.org/officeDocument/2006/relationships" xmlns:p="http://schemas.openxmlformats.org/presentationml/2006/main">
+  <p:cSld>
+    <p:spTree>
+      <p:nvGrpSpPr>
+        <p:cNvPr id="1" name=""/>
+        <p:cNvGrpSpPr/>
+        <p:nvPr/>
+      </p:nvGrpSpPr>
+      <p:grpSpPr>
+        <a:xfrm>
+          <a:off x="0" y="0"/>
+          <a:ext cx="0" cy="0"/>
+          <a:chOff x="0" y="0"/>
+          <a:chExt cx="0" cy="0"/>
+        </a:xfrm>
+      </p:grpSpPr>
+      <p:sp>
+        <p:nvSpPr>
           <p:cNvPr id="3" name="Title 2">
             <a:extLst>
               <a:ext uri="{FF2B5EF4-FFF2-40B4-BE49-F238E27FC236}">
@@ -7259,16 +8654,15 @@
           <a:lstStyle/>
           <a:p>
             <a:r>
-              <a:rPr lang="en-US"/>
+              <a:rPr lang="en-US" dirty="0"/>
               <a:t>Learn to infuse energy into your delivery to leave a lasting impression</a:t>
             </a:r>
           </a:p>
           <a:p>
             <a:r>
-              <a:rPr lang="en-US"/>
+              <a:rPr lang="en-US" dirty="0"/>
               <a:t>One of the goals of effective communication is to motivate your audience</a:t>
             </a:r>
-            <a:endParaRPr lang="en-US" dirty="0"/>
           </a:p>
         </p:txBody>
       </p:sp>
@@ -7744,7 +9138,7 @@
             <a:fld id="{A49DFD55-3C28-40EF-9E31-A92D2E4017FF}" type="slidenum">
               <a:rPr lang="en-US" smtClean="0"/>
               <a:pPr/>
-              <a:t>10</a:t>
+              <a:t>8</a:t>
             </a:fld>
             <a:endParaRPr lang="en-US" dirty="0"/>
           </a:p>
@@ -7754,2161 +9148,6 @@
     <p:extLst>
       <p:ext uri="{BB962C8B-B14F-4D97-AF65-F5344CB8AC3E}">
         <p14:creationId xmlns:p14="http://schemas.microsoft.com/office/powerpoint/2010/main" val="1658164610"/>
-      </p:ext>
-    </p:extLst>
-  </p:cSld>
-  <p:clrMapOvr>
-    <a:masterClrMapping/>
-  </p:clrMapOvr>
-</p:sld>
-</file>
-
-<file path=ppt/slides/slide11.xml><?xml version="1.0" encoding="utf-8"?>
-<p:sld xmlns:a="http://schemas.openxmlformats.org/drawingml/2006/main" xmlns:r="http://schemas.openxmlformats.org/officeDocument/2006/relationships" xmlns:p="http://schemas.openxmlformats.org/presentationml/2006/main">
-  <p:cSld>
-    <p:spTree>
-      <p:nvGrpSpPr>
-        <p:cNvPr id="1" name=""/>
-        <p:cNvGrpSpPr/>
-        <p:nvPr/>
-      </p:nvGrpSpPr>
-      <p:grpSpPr>
-        <a:xfrm>
-          <a:off x="0" y="0"/>
-          <a:ext cx="0" cy="0"/>
-          <a:chOff x="0" y="0"/>
-          <a:chExt cx="0" cy="0"/>
-        </a:xfrm>
-      </p:grpSpPr>
-      <p:sp>
-        <p:nvSpPr>
-          <p:cNvPr id="17" name="Title 1">
-            <a:extLst>
-              <a:ext uri="{FF2B5EF4-FFF2-40B4-BE49-F238E27FC236}">
-                <a16:creationId xmlns:a16="http://schemas.microsoft.com/office/drawing/2014/main" id="{09140014-73D5-419B-8867-972BB18D52D4}"/>
-              </a:ext>
-            </a:extLst>
-          </p:cNvPr>
-          <p:cNvSpPr>
-            <a:spLocks noGrp="1"/>
-          </p:cNvSpPr>
-          <p:nvPr>
-            <p:ph type="title"/>
-          </p:nvPr>
-        </p:nvSpPr>
-        <p:spPr>
-          <a:xfrm>
-            <a:off x="838200" y="337192"/>
-            <a:ext cx="5655197" cy="1997867"/>
-          </a:xfrm>
-        </p:spPr>
-        <p:txBody>
-          <a:bodyPr anchor="b"/>
-          <a:lstStyle/>
-          <a:p>
-            <a:r>
-              <a:rPr lang="en-US" dirty="0"/>
-              <a:t>Final tips &amp; takeaways</a:t>
-            </a:r>
-          </a:p>
-        </p:txBody>
-      </p:sp>
-      <p:sp>
-        <p:nvSpPr>
-          <p:cNvPr id="6" name="Text Placeholder 5">
-            <a:extLst>
-              <a:ext uri="{FF2B5EF4-FFF2-40B4-BE49-F238E27FC236}">
-                <a16:creationId xmlns:a16="http://schemas.microsoft.com/office/drawing/2014/main" id="{D2E1CF79-4FDC-8CAF-CC16-E309A2C49758}"/>
-              </a:ext>
-            </a:extLst>
-          </p:cNvPr>
-          <p:cNvSpPr>
-            <a:spLocks noGrp="1"/>
-          </p:cNvSpPr>
-          <p:nvPr>
-            <p:ph type="body" idx="1"/>
-          </p:nvPr>
-        </p:nvSpPr>
-        <p:spPr>
-          <a:xfrm>
-            <a:off x="838200" y="2705177"/>
-            <a:ext cx="5733772" cy="448990"/>
-          </a:xfrm>
-        </p:spPr>
-        <p:txBody>
-          <a:bodyPr/>
-          <a:lstStyle/>
-          <a:p>
-            <a:r>
-              <a:rPr lang="en-US" dirty="0"/>
-              <a:t>Practice makes perfect</a:t>
-            </a:r>
-          </a:p>
-        </p:txBody>
-      </p:sp>
-      <p:sp>
-        <p:nvSpPr>
-          <p:cNvPr id="20" name="Content Placeholder 3">
-            <a:extLst>
-              <a:ext uri="{FF2B5EF4-FFF2-40B4-BE49-F238E27FC236}">
-                <a16:creationId xmlns:a16="http://schemas.microsoft.com/office/drawing/2014/main" id="{33D8731E-4977-402E-8BFD-895B4D0544CC}"/>
-              </a:ext>
-            </a:extLst>
-          </p:cNvPr>
-          <p:cNvSpPr>
-            <a:spLocks noGrp="1"/>
-          </p:cNvSpPr>
-          <p:nvPr>
-            <p:ph sz="half" idx="2"/>
-          </p:nvPr>
-        </p:nvSpPr>
-        <p:spPr>
-          <a:xfrm>
-            <a:off x="838199" y="3154166"/>
-            <a:ext cx="5733773" cy="3032733"/>
-          </a:xfrm>
-        </p:spPr>
-        <p:txBody>
-          <a:bodyPr>
-            <a:noAutofit/>
-          </a:bodyPr>
-          <a:lstStyle/>
-          <a:p>
-            <a:r>
-              <a:rPr lang="en-US" dirty="0"/>
-              <a:t>Consistent rehearsal</a:t>
-            </a:r>
-          </a:p>
-          <a:p>
-            <a:pPr lvl="1"/>
-            <a:r>
-              <a:rPr lang="en-US" dirty="0"/>
-              <a:t>Strengthen your familiarity</a:t>
-            </a:r>
-          </a:p>
-          <a:p>
-            <a:r>
-              <a:rPr lang="en-US" dirty="0"/>
-              <a:t>Refine delivery style</a:t>
-            </a:r>
-          </a:p>
-          <a:p>
-            <a:pPr lvl="1"/>
-            <a:r>
-              <a:rPr lang="en-US" dirty="0"/>
-              <a:t>Pacing, tone, and emphasis</a:t>
-            </a:r>
-          </a:p>
-          <a:p>
-            <a:r>
-              <a:rPr lang="en-US" dirty="0"/>
-              <a:t>Timing and transitions</a:t>
-            </a:r>
-          </a:p>
-          <a:p>
-            <a:pPr lvl="1"/>
-            <a:r>
-              <a:rPr lang="en-US" dirty="0"/>
-              <a:t>Aim for seamless, professional delivery</a:t>
-            </a:r>
-          </a:p>
-          <a:p>
-            <a:r>
-              <a:rPr lang="en-US" dirty="0"/>
-              <a:t>Practice audience</a:t>
-            </a:r>
-          </a:p>
-          <a:p>
-            <a:pPr lvl="1"/>
-            <a:r>
-              <a:rPr lang="en-US" dirty="0"/>
-              <a:t>Enlist colleagues to listen &amp; provide feedback</a:t>
-            </a:r>
-          </a:p>
-          <a:p>
-            <a:endParaRPr lang="en-US" dirty="0"/>
-          </a:p>
-        </p:txBody>
-      </p:sp>
-      <p:sp>
-        <p:nvSpPr>
-          <p:cNvPr id="34" name="Text Placeholder 33">
-            <a:extLst>
-              <a:ext uri="{FF2B5EF4-FFF2-40B4-BE49-F238E27FC236}">
-                <a16:creationId xmlns:a16="http://schemas.microsoft.com/office/drawing/2014/main" id="{AE07A905-8B37-D13F-25D3-1D3BCDB86B0B}"/>
-              </a:ext>
-            </a:extLst>
-          </p:cNvPr>
-          <p:cNvSpPr>
-            <a:spLocks noGrp="1"/>
-          </p:cNvSpPr>
-          <p:nvPr>
-            <p:ph type="body" sz="quarter" idx="3"/>
-          </p:nvPr>
-        </p:nvSpPr>
-        <p:spPr>
-          <a:xfrm>
-            <a:off x="7887108" y="2705177"/>
-            <a:ext cx="3943627" cy="448989"/>
-          </a:xfrm>
-        </p:spPr>
-        <p:txBody>
-          <a:bodyPr/>
-          <a:lstStyle/>
-          <a:p>
-            <a:r>
-              <a:rPr lang="en-US" dirty="0"/>
-              <a:t>Continue improving</a:t>
-            </a:r>
-          </a:p>
-        </p:txBody>
-      </p:sp>
-      <p:sp>
-        <p:nvSpPr>
-          <p:cNvPr id="35" name="Content Placeholder 34">
-            <a:extLst>
-              <a:ext uri="{FF2B5EF4-FFF2-40B4-BE49-F238E27FC236}">
-                <a16:creationId xmlns:a16="http://schemas.microsoft.com/office/drawing/2014/main" id="{4E9A764F-6B65-050E-E561-82F77339D164}"/>
-              </a:ext>
-            </a:extLst>
-          </p:cNvPr>
-          <p:cNvSpPr>
-            <a:spLocks noGrp="1"/>
-          </p:cNvSpPr>
-          <p:nvPr>
-            <p:ph sz="half" idx="14"/>
-          </p:nvPr>
-        </p:nvSpPr>
-        <p:spPr>
-          <a:xfrm>
-            <a:off x="7887107" y="3164867"/>
-            <a:ext cx="3943627" cy="3032733"/>
-          </a:xfrm>
-        </p:spPr>
-        <p:txBody>
-          <a:bodyPr>
-            <a:normAutofit/>
-          </a:bodyPr>
-          <a:lstStyle/>
-          <a:p>
-            <a:r>
-              <a:rPr lang="en-US" dirty="0"/>
-              <a:t>Seek feedback</a:t>
-            </a:r>
-          </a:p>
-          <a:p>
-            <a:r>
-              <a:rPr lang="en-US" dirty="0"/>
-              <a:t>Reflect on performance</a:t>
-            </a:r>
-          </a:p>
-          <a:p>
-            <a:r>
-              <a:rPr lang="en-US" dirty="0"/>
-              <a:t>Explore new techniques</a:t>
-            </a:r>
-          </a:p>
-          <a:p>
-            <a:r>
-              <a:rPr lang="en-US" dirty="0"/>
-              <a:t>Set personal goals</a:t>
-            </a:r>
-          </a:p>
-          <a:p>
-            <a:r>
-              <a:rPr lang="en-US" dirty="0"/>
-              <a:t>Iterate and adapt</a:t>
-            </a:r>
-          </a:p>
-        </p:txBody>
-      </p:sp>
-      <p:sp>
-        <p:nvSpPr>
-          <p:cNvPr id="9" name="Slide Number Placeholder 8">
-            <a:extLst>
-              <a:ext uri="{FF2B5EF4-FFF2-40B4-BE49-F238E27FC236}">
-                <a16:creationId xmlns:a16="http://schemas.microsoft.com/office/drawing/2014/main" id="{C396FFDC-ADE8-4009-A466-A81787258E88}"/>
-              </a:ext>
-            </a:extLst>
-          </p:cNvPr>
-          <p:cNvSpPr>
-            <a:spLocks noGrp="1"/>
-          </p:cNvSpPr>
-          <p:nvPr>
-            <p:ph type="sldNum" sz="quarter" idx="12"/>
-          </p:nvPr>
-        </p:nvSpPr>
-        <p:spPr>
-          <a:xfrm>
-            <a:off x="8610600" y="6356350"/>
-            <a:ext cx="2743200" cy="365125"/>
-          </a:xfrm>
-        </p:spPr>
-        <p:txBody>
-          <a:bodyPr/>
-          <a:lstStyle/>
-          <a:p>
-            <a:fld id="{A49DFD55-3C28-40EF-9E31-A92D2E4017FF}" type="slidenum">
-              <a:rPr lang="en-US" smtClean="0"/>
-              <a:pPr/>
-              <a:t>11</a:t>
-            </a:fld>
-            <a:endParaRPr lang="en-US" dirty="0"/>
-          </a:p>
-        </p:txBody>
-      </p:sp>
-    </p:spTree>
-    <p:extLst>
-      <p:ext uri="{BB962C8B-B14F-4D97-AF65-F5344CB8AC3E}">
-        <p14:creationId xmlns:p14="http://schemas.microsoft.com/office/powerpoint/2010/main" val="2403577982"/>
-      </p:ext>
-    </p:extLst>
-  </p:cSld>
-  <p:clrMapOvr>
-    <a:masterClrMapping/>
-  </p:clrMapOvr>
-</p:sld>
-</file>
-
-<file path=ppt/slides/slide12.xml><?xml version="1.0" encoding="utf-8"?>
-<p:sld xmlns:a="http://schemas.openxmlformats.org/drawingml/2006/main" xmlns:r="http://schemas.openxmlformats.org/officeDocument/2006/relationships" xmlns:p="http://schemas.openxmlformats.org/presentationml/2006/main">
-  <p:cSld>
-    <p:spTree>
-      <p:nvGrpSpPr>
-        <p:cNvPr id="1" name=""/>
-        <p:cNvGrpSpPr/>
-        <p:nvPr/>
-      </p:nvGrpSpPr>
-      <p:grpSpPr>
-        <a:xfrm>
-          <a:off x="0" y="0"/>
-          <a:ext cx="0" cy="0"/>
-          <a:chOff x="0" y="0"/>
-          <a:chExt cx="0" cy="0"/>
-        </a:xfrm>
-      </p:grpSpPr>
-      <p:sp>
-        <p:nvSpPr>
-          <p:cNvPr id="8" name="Title 2">
-            <a:extLst>
-              <a:ext uri="{FF2B5EF4-FFF2-40B4-BE49-F238E27FC236}">
-                <a16:creationId xmlns:a16="http://schemas.microsoft.com/office/drawing/2014/main" id="{3E5FEE2D-79E5-4C1D-8BF7-EE619CA7039A}"/>
-              </a:ext>
-            </a:extLst>
-          </p:cNvPr>
-          <p:cNvSpPr>
-            <a:spLocks noGrp="1"/>
-          </p:cNvSpPr>
-          <p:nvPr>
-            <p:ph type="title"/>
-          </p:nvPr>
-        </p:nvSpPr>
-        <p:spPr>
-          <a:xfrm>
-            <a:off x="838200" y="353550"/>
-            <a:ext cx="10515600" cy="1325563"/>
-          </a:xfrm>
-        </p:spPr>
-        <p:txBody>
-          <a:bodyPr anchor="b"/>
-          <a:lstStyle/>
-          <a:p>
-            <a:r>
-              <a:rPr lang="en-US" dirty="0"/>
-              <a:t>Speaking engagement metrics</a:t>
-            </a:r>
-          </a:p>
-        </p:txBody>
-      </p:sp>
-      <p:graphicFrame>
-        <p:nvGraphicFramePr>
-          <p:cNvPr id="13" name="Table Placeholder 2">
-            <a:extLst>
-              <a:ext uri="{FF2B5EF4-FFF2-40B4-BE49-F238E27FC236}">
-                <a16:creationId xmlns:a16="http://schemas.microsoft.com/office/drawing/2014/main" id="{4A94C7BE-6E60-66F0-EFD4-2F452B0D743A}"/>
-              </a:ext>
-            </a:extLst>
-          </p:cNvPr>
-          <p:cNvGraphicFramePr>
-            <a:graphicFrameLocks noGrp="1"/>
-          </p:cNvGraphicFramePr>
-          <p:nvPr>
-            <p:ph type="tbl" sz="quarter" idx="14"/>
-            <p:extLst>
-              <p:ext uri="{D42A27DB-BD31-4B8C-83A1-F6EECF244321}">
-                <p14:modId xmlns:p14="http://schemas.microsoft.com/office/powerpoint/2010/main" val="1224246859"/>
-              </p:ext>
-            </p:extLst>
-          </p:nvPr>
-        </p:nvGraphicFramePr>
-        <p:xfrm>
-          <a:off x="838200" y="2111375"/>
-          <a:ext cx="10515601" cy="3570968"/>
-        </p:xfrm>
-        <a:graphic>
-          <a:graphicData uri="http://schemas.openxmlformats.org/drawingml/2006/table">
-            <a:tbl>
-              <a:tblPr firstRow="1" bandRow="1">
-                <a:tableStyleId>{7E9639D4-E3E2-4D34-9284-5A2195B3D0D7}</a:tableStyleId>
-              </a:tblPr>
-              <a:tblGrid>
-                <a:gridCol w="3433998">
-                  <a:extLst>
-                    <a:ext uri="{9D8B030D-6E8A-4147-A177-3AD203B41FA5}">
-                      <a16:colId xmlns:a16="http://schemas.microsoft.com/office/drawing/2014/main" val="127040821"/>
-                    </a:ext>
-                  </a:extLst>
-                </a:gridCol>
-                <a:gridCol w="2450892">
-                  <a:extLst>
-                    <a:ext uri="{9D8B030D-6E8A-4147-A177-3AD203B41FA5}">
-                      <a16:colId xmlns:a16="http://schemas.microsoft.com/office/drawing/2014/main" val="149845700"/>
-                    </a:ext>
-                  </a:extLst>
-                </a:gridCol>
-                <a:gridCol w="2375942">
-                  <a:extLst>
-                    <a:ext uri="{9D8B030D-6E8A-4147-A177-3AD203B41FA5}">
-                      <a16:colId xmlns:a16="http://schemas.microsoft.com/office/drawing/2014/main" val="3119692462"/>
-                    </a:ext>
-                  </a:extLst>
-                </a:gridCol>
-                <a:gridCol w="2254769">
-                  <a:extLst>
-                    <a:ext uri="{9D8B030D-6E8A-4147-A177-3AD203B41FA5}">
-                      <a16:colId xmlns:a16="http://schemas.microsoft.com/office/drawing/2014/main" val="3472639139"/>
-                    </a:ext>
-                  </a:extLst>
-                </a:gridCol>
-              </a:tblGrid>
-              <a:tr h="733347">
-                <a:tc>
-                  <a:txBody>
-                    <a:bodyPr/>
-                    <a:lstStyle/>
-                    <a:p>
-                      <a:pPr algn="ctr"/>
-                      <a:r>
-                        <a:rPr lang="en-US" b="0" dirty="0"/>
-                        <a:t>IMPACT FACTOR</a:t>
-                      </a:r>
-                    </a:p>
-                  </a:txBody>
-                  <a:tcPr anchor="ctr"/>
-                </a:tc>
-                <a:tc>
-                  <a:txBody>
-                    <a:bodyPr/>
-                    <a:lstStyle/>
-                    <a:p>
-                      <a:pPr algn="ctr"/>
-                      <a:r>
-                        <a:rPr lang="en-US" b="0" dirty="0"/>
-                        <a:t>MEASUREMENT</a:t>
-                      </a:r>
-                    </a:p>
-                  </a:txBody>
-                  <a:tcPr anchor="ctr"/>
-                </a:tc>
-                <a:tc>
-                  <a:txBody>
-                    <a:bodyPr/>
-                    <a:lstStyle/>
-                    <a:p>
-                      <a:pPr algn="ctr"/>
-                      <a:r>
-                        <a:rPr lang="en-US" b="0" dirty="0"/>
-                        <a:t>TARGET</a:t>
-                      </a:r>
-                    </a:p>
-                  </a:txBody>
-                  <a:tcPr anchor="ctr"/>
-                </a:tc>
-                <a:tc>
-                  <a:txBody>
-                    <a:bodyPr/>
-                    <a:lstStyle/>
-                    <a:p>
-                      <a:pPr algn="ctr"/>
-                      <a:r>
-                        <a:rPr lang="en-US" b="0" dirty="0"/>
-                        <a:t>ACHIEVED</a:t>
-                      </a:r>
-                    </a:p>
-                  </a:txBody>
-                  <a:tcPr anchor="ctr"/>
-                </a:tc>
-                <a:extLst>
-                  <a:ext uri="{0D108BD9-81ED-4DB2-BD59-A6C34878D82A}">
-                    <a16:rowId xmlns:a16="http://schemas.microsoft.com/office/drawing/2014/main" val="3298013591"/>
-                  </a:ext>
-                </a:extLst>
-              </a:tr>
-              <a:tr h="531843">
-                <a:tc>
-                  <a:txBody>
-                    <a:bodyPr/>
-                    <a:lstStyle/>
-                    <a:p>
-                      <a:pPr algn="ctr"/>
-                      <a:r>
-                        <a:rPr lang="en-US" dirty="0"/>
-                        <a:t>Audience interaction</a:t>
-                      </a:r>
-                    </a:p>
-                  </a:txBody>
-                  <a:tcPr anchor="ctr"/>
-                </a:tc>
-                <a:tc>
-                  <a:txBody>
-                    <a:bodyPr/>
-                    <a:lstStyle/>
-                    <a:p>
-                      <a:pPr algn="ctr"/>
-                      <a:r>
-                        <a:rPr lang="en-US" dirty="0"/>
-                        <a:t>Percentage (%)</a:t>
-                      </a:r>
-                    </a:p>
-                  </a:txBody>
-                  <a:tcPr anchor="ctr"/>
-                </a:tc>
-                <a:tc>
-                  <a:txBody>
-                    <a:bodyPr/>
-                    <a:lstStyle/>
-                    <a:p>
-                      <a:pPr algn="ctr"/>
-                      <a:r>
-                        <a:rPr lang="en-US" dirty="0"/>
-                        <a:t>85</a:t>
-                      </a:r>
-                    </a:p>
-                  </a:txBody>
-                  <a:tcPr anchor="ctr"/>
-                </a:tc>
-                <a:tc>
-                  <a:txBody>
-                    <a:bodyPr/>
-                    <a:lstStyle/>
-                    <a:p>
-                      <a:pPr algn="ctr"/>
-                      <a:r>
-                        <a:rPr lang="en-US" dirty="0"/>
-                        <a:t>88</a:t>
-                      </a:r>
-                    </a:p>
-                  </a:txBody>
-                  <a:tcPr anchor="ctr"/>
-                </a:tc>
-                <a:extLst>
-                  <a:ext uri="{0D108BD9-81ED-4DB2-BD59-A6C34878D82A}">
-                    <a16:rowId xmlns:a16="http://schemas.microsoft.com/office/drawing/2014/main" val="3873867931"/>
-                  </a:ext>
-                </a:extLst>
-              </a:tr>
-              <a:tr h="531843">
-                <a:tc>
-                  <a:txBody>
-                    <a:bodyPr/>
-                    <a:lstStyle/>
-                    <a:p>
-                      <a:pPr algn="ctr"/>
-                      <a:r>
-                        <a:rPr lang="en-US" dirty="0"/>
-                        <a:t>Knowledge retention</a:t>
-                      </a:r>
-                    </a:p>
-                  </a:txBody>
-                  <a:tcPr anchor="ctr"/>
-                </a:tc>
-                <a:tc>
-                  <a:txBody>
-                    <a:bodyPr/>
-                    <a:lstStyle/>
-                    <a:p>
-                      <a:pPr algn="ctr"/>
-                      <a:r>
-                        <a:rPr lang="en-US" dirty="0"/>
-                        <a:t>Percentage (%)</a:t>
-                      </a:r>
-                    </a:p>
-                  </a:txBody>
-                  <a:tcPr anchor="ctr"/>
-                </a:tc>
-                <a:tc>
-                  <a:txBody>
-                    <a:bodyPr/>
-                    <a:lstStyle/>
-                    <a:p>
-                      <a:pPr algn="ctr"/>
-                      <a:r>
-                        <a:rPr lang="en-US" dirty="0"/>
-                        <a:t>75</a:t>
-                      </a:r>
-                    </a:p>
-                  </a:txBody>
-                  <a:tcPr anchor="ctr"/>
-                </a:tc>
-                <a:tc>
-                  <a:txBody>
-                    <a:bodyPr/>
-                    <a:lstStyle/>
-                    <a:p>
-                      <a:pPr algn="ctr"/>
-                      <a:r>
-                        <a:rPr lang="en-US" dirty="0"/>
-                        <a:t>80</a:t>
-                      </a:r>
-                    </a:p>
-                  </a:txBody>
-                  <a:tcPr anchor="ctr"/>
-                </a:tc>
-                <a:extLst>
-                  <a:ext uri="{0D108BD9-81ED-4DB2-BD59-A6C34878D82A}">
-                    <a16:rowId xmlns:a16="http://schemas.microsoft.com/office/drawing/2014/main" val="85209771"/>
-                  </a:ext>
-                </a:extLst>
-              </a:tr>
-              <a:tr h="531843">
-                <a:tc>
-                  <a:txBody>
-                    <a:bodyPr/>
-                    <a:lstStyle/>
-                    <a:p>
-                      <a:pPr algn="ctr"/>
-                      <a:r>
-                        <a:rPr lang="en-US" dirty="0"/>
-                        <a:t>Post-presentation surveys</a:t>
-                      </a:r>
-                    </a:p>
-                  </a:txBody>
-                  <a:tcPr anchor="ctr"/>
-                </a:tc>
-                <a:tc>
-                  <a:txBody>
-                    <a:bodyPr/>
-                    <a:lstStyle/>
-                    <a:p>
-                      <a:pPr algn="ctr"/>
-                      <a:r>
-                        <a:rPr lang="en-US" dirty="0"/>
-                        <a:t>Average rating</a:t>
-                      </a:r>
-                    </a:p>
-                  </a:txBody>
-                  <a:tcPr anchor="ctr"/>
-                </a:tc>
-                <a:tc>
-                  <a:txBody>
-                    <a:bodyPr/>
-                    <a:lstStyle/>
-                    <a:p>
-                      <a:pPr algn="ctr"/>
-                      <a:r>
-                        <a:rPr lang="en-US" dirty="0"/>
-                        <a:t>4.2</a:t>
-                      </a:r>
-                    </a:p>
-                  </a:txBody>
-                  <a:tcPr anchor="ctr"/>
-                </a:tc>
-                <a:tc>
-                  <a:txBody>
-                    <a:bodyPr/>
-                    <a:lstStyle/>
-                    <a:p>
-                      <a:pPr algn="ctr"/>
-                      <a:r>
-                        <a:rPr lang="en-US" dirty="0"/>
-                        <a:t>4.5</a:t>
-                      </a:r>
-                    </a:p>
-                  </a:txBody>
-                  <a:tcPr anchor="ctr"/>
-                </a:tc>
-                <a:extLst>
-                  <a:ext uri="{0D108BD9-81ED-4DB2-BD59-A6C34878D82A}">
-                    <a16:rowId xmlns:a16="http://schemas.microsoft.com/office/drawing/2014/main" val="4061031278"/>
-                  </a:ext>
-                </a:extLst>
-              </a:tr>
-              <a:tr h="531843">
-                <a:tc>
-                  <a:txBody>
-                    <a:bodyPr/>
-                    <a:lstStyle/>
-                    <a:p>
-                      <a:pPr algn="ctr"/>
-                      <a:r>
-                        <a:rPr lang="en-US" dirty="0"/>
-                        <a:t>Referral rate</a:t>
-                      </a:r>
-                    </a:p>
-                  </a:txBody>
-                  <a:tcPr anchor="ctr"/>
-                </a:tc>
-                <a:tc>
-                  <a:txBody>
-                    <a:bodyPr/>
-                    <a:lstStyle/>
-                    <a:p>
-                      <a:pPr algn="ctr"/>
-                      <a:r>
-                        <a:rPr lang="en-US" dirty="0"/>
-                        <a:t>Percentage (%)</a:t>
-                      </a:r>
-                    </a:p>
-                  </a:txBody>
-                  <a:tcPr anchor="ctr"/>
-                </a:tc>
-                <a:tc>
-                  <a:txBody>
-                    <a:bodyPr/>
-                    <a:lstStyle/>
-                    <a:p>
-                      <a:pPr algn="ctr"/>
-                      <a:r>
-                        <a:rPr lang="en-US" dirty="0"/>
-                        <a:t>10</a:t>
-                      </a:r>
-                    </a:p>
-                  </a:txBody>
-                  <a:tcPr anchor="ctr"/>
-                </a:tc>
-                <a:tc>
-                  <a:txBody>
-                    <a:bodyPr/>
-                    <a:lstStyle/>
-                    <a:p>
-                      <a:pPr algn="ctr"/>
-                      <a:r>
-                        <a:rPr lang="en-US" dirty="0"/>
-                        <a:t>12</a:t>
-                      </a:r>
-                    </a:p>
-                  </a:txBody>
-                  <a:tcPr anchor="ctr"/>
-                </a:tc>
-                <a:extLst>
-                  <a:ext uri="{0D108BD9-81ED-4DB2-BD59-A6C34878D82A}">
-                    <a16:rowId xmlns:a16="http://schemas.microsoft.com/office/drawing/2014/main" val="3591840781"/>
-                  </a:ext>
-                </a:extLst>
-              </a:tr>
-              <a:tr h="710249">
-                <a:tc>
-                  <a:txBody>
-                    <a:bodyPr/>
-                    <a:lstStyle/>
-                    <a:p>
-                      <a:pPr algn="ctr"/>
-                      <a:r>
-                        <a:rPr lang="en-US" dirty="0"/>
-                        <a:t>Collaboration opportunities</a:t>
-                      </a:r>
-                    </a:p>
-                  </a:txBody>
-                  <a:tcPr anchor="ctr"/>
-                </a:tc>
-                <a:tc>
-                  <a:txBody>
-                    <a:bodyPr/>
-                    <a:lstStyle/>
-                    <a:p>
-                      <a:pPr algn="ctr"/>
-                      <a:r>
-                        <a:rPr lang="en-US" dirty="0"/>
-                        <a:t># of opportunities</a:t>
-                      </a:r>
-                    </a:p>
-                  </a:txBody>
-                  <a:tcPr anchor="ctr"/>
-                </a:tc>
-                <a:tc>
-                  <a:txBody>
-                    <a:bodyPr/>
-                    <a:lstStyle/>
-                    <a:p>
-                      <a:pPr algn="ctr"/>
-                      <a:r>
-                        <a:rPr lang="en-US" dirty="0"/>
-                        <a:t>8</a:t>
-                      </a:r>
-                    </a:p>
-                  </a:txBody>
-                  <a:tcPr anchor="ctr"/>
-                </a:tc>
-                <a:tc>
-                  <a:txBody>
-                    <a:bodyPr/>
-                    <a:lstStyle/>
-                    <a:p>
-                      <a:pPr algn="ctr"/>
-                      <a:r>
-                        <a:rPr lang="en-US" dirty="0"/>
-                        <a:t>10</a:t>
-                      </a:r>
-                    </a:p>
-                  </a:txBody>
-                  <a:tcPr anchor="ctr"/>
-                </a:tc>
-                <a:extLst>
-                  <a:ext uri="{0D108BD9-81ED-4DB2-BD59-A6C34878D82A}">
-                    <a16:rowId xmlns:a16="http://schemas.microsoft.com/office/drawing/2014/main" val="335389741"/>
-                  </a:ext>
-                </a:extLst>
-              </a:tr>
-            </a:tbl>
-          </a:graphicData>
-        </a:graphic>
-      </p:graphicFrame>
-      <p:sp>
-        <p:nvSpPr>
-          <p:cNvPr id="5" name="Slide Number Placeholder 5">
-            <a:extLst>
-              <a:ext uri="{FF2B5EF4-FFF2-40B4-BE49-F238E27FC236}">
-                <a16:creationId xmlns:a16="http://schemas.microsoft.com/office/drawing/2014/main" id="{4832B776-E386-1CF9-CC8F-2D2FF3EA7066}"/>
-              </a:ext>
-            </a:extLst>
-          </p:cNvPr>
-          <p:cNvSpPr>
-            <a:spLocks noGrp="1"/>
-          </p:cNvSpPr>
-          <p:nvPr>
-            <p:ph type="sldNum" sz="quarter" idx="12"/>
-          </p:nvPr>
-        </p:nvSpPr>
-        <p:spPr>
-          <a:xfrm>
-            <a:off x="10373350" y="6356349"/>
-            <a:ext cx="987552" cy="365125"/>
-          </a:xfrm>
-        </p:spPr>
-        <p:txBody>
-          <a:bodyPr/>
-          <a:lstStyle/>
-          <a:p>
-            <a:fld id="{A49DFD55-3C28-40EF-9E31-A92D2E4017FF}" type="slidenum">
-              <a:rPr lang="en-US" smtClean="0"/>
-              <a:pPr/>
-              <a:t>12</a:t>
-            </a:fld>
-            <a:endParaRPr lang="en-US" dirty="0"/>
-          </a:p>
-        </p:txBody>
-      </p:sp>
-    </p:spTree>
-    <p:extLst>
-      <p:ext uri="{BB962C8B-B14F-4D97-AF65-F5344CB8AC3E}">
-        <p14:creationId xmlns:p14="http://schemas.microsoft.com/office/powerpoint/2010/main" val="2791821786"/>
-      </p:ext>
-    </p:extLst>
-  </p:cSld>
-  <p:clrMapOvr>
-    <a:masterClrMapping/>
-  </p:clrMapOvr>
-</p:sld>
-</file>
-
-<file path=ppt/slides/slide13.xml><?xml version="1.0" encoding="utf-8"?>
-<p:sld xmlns:a="http://schemas.openxmlformats.org/drawingml/2006/main" xmlns:r="http://schemas.openxmlformats.org/officeDocument/2006/relationships" xmlns:p="http://schemas.openxmlformats.org/presentationml/2006/main">
-  <p:cSld>
-    <p:spTree>
-      <p:nvGrpSpPr>
-        <p:cNvPr id="1" name=""/>
-        <p:cNvGrpSpPr/>
-        <p:nvPr/>
-      </p:nvGrpSpPr>
-      <p:grpSpPr>
-        <a:xfrm>
-          <a:off x="0" y="0"/>
-          <a:ext cx="0" cy="0"/>
-          <a:chOff x="0" y="0"/>
-          <a:chExt cx="0" cy="0"/>
-        </a:xfrm>
-      </p:grpSpPr>
-      <p:sp>
-        <p:nvSpPr>
-          <p:cNvPr id="2" name="Title 1">
-            <a:extLst>
-              <a:ext uri="{FF2B5EF4-FFF2-40B4-BE49-F238E27FC236}">
-                <a16:creationId xmlns:a16="http://schemas.microsoft.com/office/drawing/2014/main" id="{8BDF1EDE-5423-435C-B149-87AB1BC22B83}"/>
-              </a:ext>
-            </a:extLst>
-          </p:cNvPr>
-          <p:cNvSpPr>
-            <a:spLocks noGrp="1"/>
-          </p:cNvSpPr>
-          <p:nvPr>
-            <p:ph type="ctrTitle"/>
-          </p:nvPr>
-        </p:nvSpPr>
-        <p:spPr>
-          <a:xfrm>
-            <a:off x="4267200" y="1615736"/>
-            <a:ext cx="4179570" cy="1524735"/>
-          </a:xfrm>
-        </p:spPr>
-        <p:txBody>
-          <a:bodyPr/>
-          <a:lstStyle/>
-          <a:p>
-            <a:r>
-              <a:rPr lang="en-US" dirty="0"/>
-              <a:t>THANK YOU</a:t>
-            </a:r>
-          </a:p>
-        </p:txBody>
-      </p:sp>
-      <p:sp>
-        <p:nvSpPr>
-          <p:cNvPr id="3" name="Subtitle 2">
-            <a:extLst>
-              <a:ext uri="{FF2B5EF4-FFF2-40B4-BE49-F238E27FC236}">
-                <a16:creationId xmlns:a16="http://schemas.microsoft.com/office/drawing/2014/main" id="{AF64C29E-DF30-4DC6-AB95-2016F9A703B6}"/>
-              </a:ext>
-            </a:extLst>
-          </p:cNvPr>
-          <p:cNvSpPr>
-            <a:spLocks noGrp="1"/>
-          </p:cNvSpPr>
-          <p:nvPr>
-            <p:ph type="subTitle" idx="1"/>
-          </p:nvPr>
-        </p:nvSpPr>
-        <p:spPr>
-          <a:xfrm>
-            <a:off x="4267200" y="3238103"/>
-            <a:ext cx="4179570" cy="2850181"/>
-          </a:xfrm>
-        </p:spPr>
-        <p:txBody>
-          <a:bodyPr>
-            <a:noAutofit/>
-          </a:bodyPr>
-          <a:lstStyle/>
-          <a:p>
-            <a:r>
-              <a:rPr lang="en-US" dirty="0"/>
-              <a:t>Brita Tamm</a:t>
-            </a:r>
-          </a:p>
-          <a:p>
-            <a:r>
-              <a:rPr lang="en-US" dirty="0"/>
-              <a:t>502-555-0152</a:t>
-            </a:r>
-          </a:p>
-          <a:p>
-            <a:r>
-              <a:rPr lang="en-US" dirty="0"/>
-              <a:t>brita@firstupconsultants.com</a:t>
-            </a:r>
-          </a:p>
-          <a:p>
-            <a:r>
-              <a:rPr lang="en-US" dirty="0"/>
-              <a:t>www.firstupconsultants.com</a:t>
-            </a:r>
-          </a:p>
-        </p:txBody>
-      </p:sp>
-      <p:sp>
-        <p:nvSpPr>
-          <p:cNvPr id="6" name="Slide Number Placeholder 5">
-            <a:extLst>
-              <a:ext uri="{FF2B5EF4-FFF2-40B4-BE49-F238E27FC236}">
-                <a16:creationId xmlns:a16="http://schemas.microsoft.com/office/drawing/2014/main" id="{4C127D99-645F-4FCF-9573-FDFE2A344FA9}"/>
-              </a:ext>
-            </a:extLst>
-          </p:cNvPr>
-          <p:cNvSpPr>
-            <a:spLocks noGrp="1"/>
-          </p:cNvSpPr>
-          <p:nvPr>
-            <p:ph type="sldNum" sz="quarter" idx="12"/>
-          </p:nvPr>
-        </p:nvSpPr>
-        <p:spPr>
-          <a:xfrm>
-            <a:off x="9579428" y="6356350"/>
-            <a:ext cx="1774371" cy="365125"/>
-          </a:xfrm>
-        </p:spPr>
-        <p:txBody>
-          <a:bodyPr/>
-          <a:lstStyle/>
-          <a:p>
-            <a:fld id="{A49DFD55-3C28-40EF-9E31-A92D2E4017FF}" type="slidenum">
-              <a:rPr lang="en-US" smtClean="0"/>
-              <a:pPr/>
-              <a:t>13</a:t>
-            </a:fld>
-            <a:endParaRPr lang="en-US" dirty="0"/>
-          </a:p>
-        </p:txBody>
-      </p:sp>
-    </p:spTree>
-    <p:extLst>
-      <p:ext uri="{BB962C8B-B14F-4D97-AF65-F5344CB8AC3E}">
-        <p14:creationId xmlns:p14="http://schemas.microsoft.com/office/powerpoint/2010/main" val="1969787568"/>
-      </p:ext>
-    </p:extLst>
-  </p:cSld>
-  <p:clrMapOvr>
-    <a:masterClrMapping/>
-  </p:clrMapOvr>
-</p:sld>
-</file>
-
-<file path=ppt/slides/slide2.xml><?xml version="1.0" encoding="utf-8"?>
-<p:sld xmlns:a="http://schemas.openxmlformats.org/drawingml/2006/main" xmlns:r="http://schemas.openxmlformats.org/officeDocument/2006/relationships" xmlns:p="http://schemas.openxmlformats.org/presentationml/2006/main">
-  <p:cSld>
-    <p:spTree>
-      <p:nvGrpSpPr>
-        <p:cNvPr id="1" name=""/>
-        <p:cNvGrpSpPr/>
-        <p:nvPr/>
-      </p:nvGrpSpPr>
-      <p:grpSpPr>
-        <a:xfrm>
-          <a:off x="0" y="0"/>
-          <a:ext cx="0" cy="0"/>
-          <a:chOff x="0" y="0"/>
-          <a:chExt cx="0" cy="0"/>
-        </a:xfrm>
-      </p:grpSpPr>
-      <p:sp>
-        <p:nvSpPr>
-          <p:cNvPr id="2" name="Title 1">
-            <a:extLst>
-              <a:ext uri="{FF2B5EF4-FFF2-40B4-BE49-F238E27FC236}">
-                <a16:creationId xmlns:a16="http://schemas.microsoft.com/office/drawing/2014/main" id="{1BEF5859-10C9-4588-9727-B9362E26C29D}"/>
-              </a:ext>
-            </a:extLst>
-          </p:cNvPr>
-          <p:cNvSpPr>
-            <a:spLocks noGrp="1"/>
-          </p:cNvSpPr>
-          <p:nvPr>
-            <p:ph type="title"/>
-          </p:nvPr>
-        </p:nvSpPr>
-        <p:spPr>
-          <a:xfrm>
-            <a:off x="1333500" y="1020445"/>
-            <a:ext cx="2895600" cy="1325563"/>
-          </a:xfrm>
-        </p:spPr>
-        <p:txBody>
-          <a:bodyPr/>
-          <a:lstStyle/>
-          <a:p>
-            <a:r>
-              <a:rPr lang="en-US" dirty="0"/>
-              <a:t>AGENDA</a:t>
-            </a:r>
-          </a:p>
-        </p:txBody>
-      </p:sp>
-      <p:sp>
-        <p:nvSpPr>
-          <p:cNvPr id="3" name="Content Placeholder 2">
-            <a:extLst>
-              <a:ext uri="{FF2B5EF4-FFF2-40B4-BE49-F238E27FC236}">
-                <a16:creationId xmlns:a16="http://schemas.microsoft.com/office/drawing/2014/main" id="{5671D7E5-EF66-4BCD-8DAA-E9061157F0BE}"/>
-              </a:ext>
-            </a:extLst>
-          </p:cNvPr>
-          <p:cNvSpPr>
-            <a:spLocks noGrp="1"/>
-          </p:cNvSpPr>
-          <p:nvPr>
-            <p:ph idx="1"/>
-          </p:nvPr>
-        </p:nvSpPr>
-        <p:spPr>
-          <a:xfrm>
-            <a:off x="1333500" y="2674013"/>
-            <a:ext cx="2895600" cy="3269589"/>
-          </a:xfrm>
-        </p:spPr>
-        <p:txBody>
-          <a:bodyPr>
-            <a:normAutofit lnSpcReduction="10000"/>
-          </a:bodyPr>
-          <a:lstStyle/>
-          <a:p>
-            <a:r>
-              <a:rPr lang="en-DK" dirty="0"/>
-              <a:t>Project Introduction</a:t>
-            </a:r>
-            <a:endParaRPr lang="en-US" dirty="0"/>
-          </a:p>
-          <a:p>
-            <a:r>
-              <a:rPr lang="en-DK" dirty="0"/>
-              <a:t>Data and Pipeline Overview</a:t>
-            </a:r>
-            <a:endParaRPr lang="en-US" dirty="0"/>
-          </a:p>
-          <a:p>
-            <a:r>
-              <a:rPr lang="en-DK" dirty="0"/>
-              <a:t>DBT Snowflake Setup</a:t>
-            </a:r>
-            <a:endParaRPr lang="en-US" dirty="0"/>
-          </a:p>
-          <a:p>
-            <a:r>
-              <a:rPr lang="en-DK" dirty="0"/>
-              <a:t>Data modelling layers</a:t>
-            </a:r>
-          </a:p>
-          <a:p>
-            <a:r>
-              <a:rPr lang="en-DK" dirty="0"/>
-              <a:t>BI and Insights </a:t>
-            </a:r>
-          </a:p>
-          <a:p>
-            <a:r>
-              <a:rPr lang="en-DK" dirty="0"/>
-              <a:t>Summary </a:t>
-            </a:r>
-          </a:p>
-        </p:txBody>
-      </p:sp>
-      <p:sp>
-        <p:nvSpPr>
-          <p:cNvPr id="5" name="Slide Number Placeholder 5">
-            <a:extLst>
-              <a:ext uri="{FF2B5EF4-FFF2-40B4-BE49-F238E27FC236}">
-                <a16:creationId xmlns:a16="http://schemas.microsoft.com/office/drawing/2014/main" id="{B02A8827-B1A1-2D2F-D6DD-E886B886C43E}"/>
-              </a:ext>
-            </a:extLst>
-          </p:cNvPr>
-          <p:cNvSpPr>
-            <a:spLocks noGrp="1"/>
-          </p:cNvSpPr>
-          <p:nvPr>
-            <p:ph type="sldNum" sz="quarter" idx="12"/>
-          </p:nvPr>
-        </p:nvSpPr>
-        <p:spPr>
-          <a:xfrm>
-            <a:off x="10373350" y="6356349"/>
-            <a:ext cx="987552" cy="365125"/>
-          </a:xfrm>
-        </p:spPr>
-        <p:txBody>
-          <a:bodyPr/>
-          <a:lstStyle/>
-          <a:p>
-            <a:fld id="{A49DFD55-3C28-40EF-9E31-A92D2E4017FF}" type="slidenum">
-              <a:rPr lang="en-US" smtClean="0"/>
-              <a:pPr/>
-              <a:t>2</a:t>
-            </a:fld>
-            <a:endParaRPr lang="en-US" dirty="0"/>
-          </a:p>
-        </p:txBody>
-      </p:sp>
-    </p:spTree>
-    <p:extLst>
-      <p:ext uri="{BB962C8B-B14F-4D97-AF65-F5344CB8AC3E}">
-        <p14:creationId xmlns:p14="http://schemas.microsoft.com/office/powerpoint/2010/main" val="1713219598"/>
-      </p:ext>
-    </p:extLst>
-  </p:cSld>
-  <p:clrMapOvr>
-    <a:masterClrMapping/>
-  </p:clrMapOvr>
-</p:sld>
-</file>
-
-<file path=ppt/slides/slide3.xml><?xml version="1.0" encoding="utf-8"?>
-<p:sld xmlns:a="http://schemas.openxmlformats.org/drawingml/2006/main" xmlns:r="http://schemas.openxmlformats.org/officeDocument/2006/relationships" xmlns:p="http://schemas.openxmlformats.org/presentationml/2006/main">
-  <p:cSld>
-    <p:spTree>
-      <p:nvGrpSpPr>
-        <p:cNvPr id="1" name=""/>
-        <p:cNvGrpSpPr/>
-        <p:nvPr/>
-      </p:nvGrpSpPr>
-      <p:grpSpPr>
-        <a:xfrm>
-          <a:off x="0" y="0"/>
-          <a:ext cx="0" cy="0"/>
-          <a:chOff x="0" y="0"/>
-          <a:chExt cx="0" cy="0"/>
-        </a:xfrm>
-      </p:grpSpPr>
-      <p:sp>
-        <p:nvSpPr>
-          <p:cNvPr id="2" name="Title 1">
-            <a:extLst>
-              <a:ext uri="{FF2B5EF4-FFF2-40B4-BE49-F238E27FC236}">
-                <a16:creationId xmlns:a16="http://schemas.microsoft.com/office/drawing/2014/main" id="{9528DBD1-DB29-D44F-FD5A-3071BB37EF37}"/>
-              </a:ext>
-            </a:extLst>
-          </p:cNvPr>
-          <p:cNvSpPr>
-            <a:spLocks noGrp="1"/>
-          </p:cNvSpPr>
-          <p:nvPr>
-            <p:ph type="ctrTitle"/>
-          </p:nvPr>
-        </p:nvSpPr>
-        <p:spPr>
-          <a:xfrm>
-            <a:off x="6574118" y="1371535"/>
-            <a:ext cx="5259293" cy="3377354"/>
-          </a:xfrm>
-        </p:spPr>
-        <p:txBody>
-          <a:bodyPr/>
-          <a:lstStyle/>
-          <a:p>
-            <a:r>
-              <a:rPr lang="en-DK" dirty="0"/>
-              <a:t>Amazon E-commerce and Macroeconomic indicators in the US (2018-2022)</a:t>
-            </a:r>
-            <a:endParaRPr lang="en-US" dirty="0"/>
-          </a:p>
-        </p:txBody>
-      </p:sp>
-    </p:spTree>
-    <p:extLst>
-      <p:ext uri="{BB962C8B-B14F-4D97-AF65-F5344CB8AC3E}">
-        <p14:creationId xmlns:p14="http://schemas.microsoft.com/office/powerpoint/2010/main" val="608796113"/>
-      </p:ext>
-    </p:extLst>
-  </p:cSld>
-  <p:clrMapOvr>
-    <a:masterClrMapping/>
-  </p:clrMapOvr>
-</p:sld>
-</file>
-
-<file path=ppt/slides/slide4.xml><?xml version="1.0" encoding="utf-8"?>
-<p:sld xmlns:a="http://schemas.openxmlformats.org/drawingml/2006/main" xmlns:r="http://schemas.openxmlformats.org/officeDocument/2006/relationships" xmlns:p="http://schemas.openxmlformats.org/presentationml/2006/main">
-  <p:cSld>
-    <p:spTree>
-      <p:nvGrpSpPr>
-        <p:cNvPr id="1" name=""/>
-        <p:cNvGrpSpPr/>
-        <p:nvPr/>
-      </p:nvGrpSpPr>
-      <p:grpSpPr>
-        <a:xfrm>
-          <a:off x="0" y="0"/>
-          <a:ext cx="0" cy="0"/>
-          <a:chOff x="0" y="0"/>
-          <a:chExt cx="0" cy="0"/>
-        </a:xfrm>
-      </p:grpSpPr>
-      <p:sp>
-        <p:nvSpPr>
-          <p:cNvPr id="2" name="Title 1">
-            <a:extLst>
-              <a:ext uri="{FF2B5EF4-FFF2-40B4-BE49-F238E27FC236}">
-                <a16:creationId xmlns:a16="http://schemas.microsoft.com/office/drawing/2014/main" id="{818AFA5E-469B-2BFC-9D4E-BD1EC6E48CA0}"/>
-              </a:ext>
-            </a:extLst>
-          </p:cNvPr>
-          <p:cNvSpPr>
-            <a:spLocks noGrp="1"/>
-          </p:cNvSpPr>
-          <p:nvPr>
-            <p:ph type="ctrTitle"/>
-          </p:nvPr>
-        </p:nvSpPr>
-        <p:spPr>
-          <a:xfrm>
-            <a:off x="6991350" y="487680"/>
-            <a:ext cx="4179570" cy="3376691"/>
-          </a:xfrm>
-        </p:spPr>
-        <p:txBody>
-          <a:bodyPr/>
-          <a:lstStyle/>
-          <a:p>
-            <a:endParaRPr lang="en-US" dirty="0"/>
-          </a:p>
-        </p:txBody>
-      </p:sp>
-      <p:pic>
-        <p:nvPicPr>
-          <p:cNvPr id="16" name="Picture Placeholder 15" descr="A person stretching in a gym">
-            <a:extLst>
-              <a:ext uri="{FF2B5EF4-FFF2-40B4-BE49-F238E27FC236}">
-                <a16:creationId xmlns:a16="http://schemas.microsoft.com/office/drawing/2014/main" id="{448EF356-1822-E2AE-2794-322870D4C222}"/>
-              </a:ext>
-            </a:extLst>
-          </p:cNvPr>
-          <p:cNvPicPr>
-            <a:picLocks noGrp="1" noChangeAspect="1"/>
-          </p:cNvPicPr>
-          <p:nvPr>
-            <p:ph type="pic" sz="quarter" idx="10"/>
-          </p:nvPr>
-        </p:nvPicPr>
-        <p:blipFill>
-          <a:blip r:embed="rId3"/>
-          <a:srcRect l="44" r="44"/>
-          <a:stretch/>
-        </p:blipFill>
-        <p:spPr>
-          <a:xfrm>
-            <a:off x="0" y="-5080"/>
-            <a:ext cx="6576291" cy="6872605"/>
-          </a:xfrm>
-        </p:spPr>
-      </p:pic>
-      <p:cxnSp>
-        <p:nvCxnSpPr>
-          <p:cNvPr id="21" name="Straight Connector 20">
-            <a:extLst>
-              <a:ext uri="{FF2B5EF4-FFF2-40B4-BE49-F238E27FC236}">
-                <a16:creationId xmlns:a16="http://schemas.microsoft.com/office/drawing/2014/main" id="{944268F6-A361-9907-F87F-9C4377ECAE6D}"/>
-              </a:ext>
-              <a:ext uri="{C183D7F6-B498-43B3-948B-1728B52AA6E4}">
-                <adec:decorative xmlns:adec="http://schemas.microsoft.com/office/drawing/2017/decorative" val="1"/>
-              </a:ext>
-            </a:extLst>
-          </p:cNvPr>
-          <p:cNvCxnSpPr>
-            <a:cxnSpLocks/>
-          </p:cNvCxnSpPr>
-          <p:nvPr/>
-        </p:nvCxnSpPr>
-        <p:spPr>
-          <a:xfrm flipH="1" flipV="1">
-            <a:off x="0" y="254643"/>
-            <a:ext cx="6096000" cy="855762"/>
-          </a:xfrm>
-          <a:prstGeom prst="line">
-            <a:avLst/>
-          </a:prstGeom>
-          <a:ln>
-            <a:solidFill>
-              <a:schemeClr val="bg1"/>
-            </a:solidFill>
-          </a:ln>
-        </p:spPr>
-        <p:style>
-          <a:lnRef idx="1">
-            <a:schemeClr val="accent1"/>
-          </a:lnRef>
-          <a:fillRef idx="0">
-            <a:schemeClr val="accent1"/>
-          </a:fillRef>
-          <a:effectRef idx="0">
-            <a:schemeClr val="accent1"/>
-          </a:effectRef>
-          <a:fontRef idx="minor">
-            <a:schemeClr val="tx1"/>
-          </a:fontRef>
-        </p:style>
-      </p:cxnSp>
-    </p:spTree>
-    <p:extLst>
-      <p:ext uri="{BB962C8B-B14F-4D97-AF65-F5344CB8AC3E}">
-        <p14:creationId xmlns:p14="http://schemas.microsoft.com/office/powerpoint/2010/main" val="2241459136"/>
-      </p:ext>
-    </p:extLst>
-  </p:cSld>
-  <p:clrMapOvr>
-    <a:masterClrMapping/>
-  </p:clrMapOvr>
-</p:sld>
-</file>
-
-<file path=ppt/slides/slide5.xml><?xml version="1.0" encoding="utf-8"?>
-<p:sld xmlns:a="http://schemas.openxmlformats.org/drawingml/2006/main" xmlns:r="http://schemas.openxmlformats.org/officeDocument/2006/relationships" xmlns:p="http://schemas.openxmlformats.org/presentationml/2006/main">
-  <p:cSld>
-    <p:spTree>
-      <p:nvGrpSpPr>
-        <p:cNvPr id="1" name=""/>
-        <p:cNvGrpSpPr/>
-        <p:nvPr/>
-      </p:nvGrpSpPr>
-      <p:grpSpPr>
-        <a:xfrm>
-          <a:off x="0" y="0"/>
-          <a:ext cx="0" cy="0"/>
-          <a:chOff x="0" y="0"/>
-          <a:chExt cx="0" cy="0"/>
-        </a:xfrm>
-      </p:grpSpPr>
-      <p:sp>
-        <p:nvSpPr>
-          <p:cNvPr id="2" name="Title 1">
-            <a:extLst>
-              <a:ext uri="{FF2B5EF4-FFF2-40B4-BE49-F238E27FC236}">
-                <a16:creationId xmlns:a16="http://schemas.microsoft.com/office/drawing/2014/main" id="{0A32731C-311B-46F7-A865-6C3AF6B09A47}"/>
-              </a:ext>
-            </a:extLst>
-          </p:cNvPr>
-          <p:cNvSpPr>
-            <a:spLocks noGrp="1"/>
-          </p:cNvSpPr>
-          <p:nvPr>
-            <p:ph type="title"/>
-          </p:nvPr>
-        </p:nvSpPr>
-        <p:spPr>
-          <a:xfrm>
-            <a:off x="1322318" y="268360"/>
-            <a:ext cx="7288282" cy="2121177"/>
-          </a:xfrm>
-        </p:spPr>
-        <p:txBody>
-          <a:bodyPr/>
-          <a:lstStyle/>
-          <a:p>
-            <a:r>
-              <a:rPr lang="en-US" dirty="0"/>
-              <a:t>Engaging the audience</a:t>
-            </a:r>
-          </a:p>
-        </p:txBody>
-      </p:sp>
-      <p:sp>
-        <p:nvSpPr>
-          <p:cNvPr id="3" name="Text Placeholder 2">
-            <a:extLst>
-              <a:ext uri="{FF2B5EF4-FFF2-40B4-BE49-F238E27FC236}">
-                <a16:creationId xmlns:a16="http://schemas.microsoft.com/office/drawing/2014/main" id="{9D5232F9-FD00-464A-9F17-619C91AEF8F3}"/>
-              </a:ext>
-            </a:extLst>
-          </p:cNvPr>
-          <p:cNvSpPr>
-            <a:spLocks noGrp="1"/>
-          </p:cNvSpPr>
-          <p:nvPr>
-            <p:ph sz="half" idx="2"/>
-          </p:nvPr>
-        </p:nvSpPr>
-        <p:spPr>
-          <a:xfrm>
-            <a:off x="1322388" y="2763078"/>
-            <a:ext cx="7288212" cy="3407051"/>
-          </a:xfrm>
-        </p:spPr>
-        <p:txBody>
-          <a:bodyPr>
-            <a:normAutofit/>
-          </a:bodyPr>
-          <a:lstStyle/>
-          <a:p>
-            <a:r>
-              <a:rPr lang="en-US" dirty="0"/>
-              <a:t>Techniques for connecting </a:t>
-            </a:r>
-          </a:p>
-          <a:p>
-            <a:pPr lvl="1"/>
-            <a:r>
-              <a:rPr lang="en-US" dirty="0"/>
-              <a:t>Make eye contact with your audience to create a sense of intimacy and involvement</a:t>
-            </a:r>
-          </a:p>
-          <a:p>
-            <a:pPr lvl="1"/>
-            <a:r>
-              <a:rPr lang="en-US" dirty="0"/>
-              <a:t>Weave relatable stories into your presentation using narratives that make your message memorable and impactful</a:t>
-            </a:r>
-          </a:p>
-          <a:p>
-            <a:pPr lvl="1"/>
-            <a:r>
-              <a:rPr lang="en-US" dirty="0"/>
-              <a:t>Encourage questions and provide thoughtful responses to enhance audience participation</a:t>
-            </a:r>
-          </a:p>
-          <a:p>
-            <a:pPr lvl="1"/>
-            <a:r>
-              <a:rPr lang="en-US" dirty="0"/>
-              <a:t>Use live polls or surveys to gather audience opinions, promoting engagement and making sure the audience feel involved</a:t>
-            </a:r>
-          </a:p>
-        </p:txBody>
-      </p:sp>
-      <p:sp>
-        <p:nvSpPr>
-          <p:cNvPr id="14" name="Slide Number Placeholder 5">
-            <a:extLst>
-              <a:ext uri="{FF2B5EF4-FFF2-40B4-BE49-F238E27FC236}">
-                <a16:creationId xmlns:a16="http://schemas.microsoft.com/office/drawing/2014/main" id="{ECE635A2-70B8-3EAB-6A18-952B02EBAA1E}"/>
-              </a:ext>
-            </a:extLst>
-          </p:cNvPr>
-          <p:cNvSpPr>
-            <a:spLocks noGrp="1"/>
-          </p:cNvSpPr>
-          <p:nvPr>
-            <p:ph type="sldNum" sz="quarter" idx="12"/>
-          </p:nvPr>
-        </p:nvSpPr>
-        <p:spPr>
-          <a:xfrm>
-            <a:off x="10373350" y="6356349"/>
-            <a:ext cx="987552" cy="365125"/>
-          </a:xfrm>
-        </p:spPr>
-        <p:txBody>
-          <a:bodyPr/>
-          <a:lstStyle/>
-          <a:p>
-            <a:fld id="{A49DFD55-3C28-40EF-9E31-A92D2E4017FF}" type="slidenum">
-              <a:rPr lang="en-US" smtClean="0"/>
-              <a:pPr/>
-              <a:t>5</a:t>
-            </a:fld>
-            <a:endParaRPr lang="en-US" dirty="0"/>
-          </a:p>
-        </p:txBody>
-      </p:sp>
-    </p:spTree>
-    <p:extLst>
-      <p:ext uri="{BB962C8B-B14F-4D97-AF65-F5344CB8AC3E}">
-        <p14:creationId xmlns:p14="http://schemas.microsoft.com/office/powerpoint/2010/main" val="3571516367"/>
-      </p:ext>
-    </p:extLst>
-  </p:cSld>
-  <p:clrMapOvr>
-    <a:masterClrMapping/>
-  </p:clrMapOvr>
-</p:sld>
-</file>
-
-<file path=ppt/slides/slide6.xml><?xml version="1.0" encoding="utf-8"?>
-<p:sld xmlns:a="http://schemas.openxmlformats.org/drawingml/2006/main" xmlns:r="http://schemas.openxmlformats.org/officeDocument/2006/relationships" xmlns:p="http://schemas.openxmlformats.org/presentationml/2006/main">
-  <p:cSld>
-    <p:spTree>
-      <p:nvGrpSpPr>
-        <p:cNvPr id="1" name=""/>
-        <p:cNvGrpSpPr/>
-        <p:nvPr/>
-      </p:nvGrpSpPr>
-      <p:grpSpPr>
-        <a:xfrm>
-          <a:off x="0" y="0"/>
-          <a:ext cx="0" cy="0"/>
-          <a:chOff x="0" y="0"/>
-          <a:chExt cx="0" cy="0"/>
-        </a:xfrm>
-      </p:grpSpPr>
-      <p:sp>
-        <p:nvSpPr>
-          <p:cNvPr id="2" name="Title 1">
-            <a:extLst>
-              <a:ext uri="{FF2B5EF4-FFF2-40B4-BE49-F238E27FC236}">
-                <a16:creationId xmlns:a16="http://schemas.microsoft.com/office/drawing/2014/main" id="{566C97BE-403B-122E-90D1-2788978A0B6F}"/>
-              </a:ext>
-            </a:extLst>
-          </p:cNvPr>
-          <p:cNvSpPr>
-            <a:spLocks noGrp="1"/>
-          </p:cNvSpPr>
-          <p:nvPr>
-            <p:ph type="ctrTitle"/>
-          </p:nvPr>
-        </p:nvSpPr>
-        <p:spPr>
-          <a:xfrm>
-            <a:off x="6991350" y="406400"/>
-            <a:ext cx="4179570" cy="3457971"/>
-          </a:xfrm>
-        </p:spPr>
-        <p:txBody>
-          <a:bodyPr/>
-          <a:lstStyle/>
-          <a:p>
-            <a:r>
-              <a:rPr lang="en-US" dirty="0"/>
-              <a:t>Selecting Visual Aids</a:t>
-            </a:r>
-          </a:p>
-        </p:txBody>
-      </p:sp>
-    </p:spTree>
-    <p:extLst>
-      <p:ext uri="{BB962C8B-B14F-4D97-AF65-F5344CB8AC3E}">
-        <p14:creationId xmlns:p14="http://schemas.microsoft.com/office/powerpoint/2010/main" val="334696707"/>
-      </p:ext>
-    </p:extLst>
-  </p:cSld>
-  <p:clrMapOvr>
-    <a:masterClrMapping/>
-  </p:clrMapOvr>
-</p:sld>
-</file>
-
-<file path=ppt/slides/slide7.xml><?xml version="1.0" encoding="utf-8"?>
-<p:sld xmlns:a="http://schemas.openxmlformats.org/drawingml/2006/main" xmlns:r="http://schemas.openxmlformats.org/officeDocument/2006/relationships" xmlns:p="http://schemas.openxmlformats.org/presentationml/2006/main">
-  <p:cSld>
-    <p:spTree>
-      <p:nvGrpSpPr>
-        <p:cNvPr id="1" name=""/>
-        <p:cNvGrpSpPr/>
-        <p:nvPr/>
-      </p:nvGrpSpPr>
-      <p:grpSpPr>
-        <a:xfrm>
-          <a:off x="0" y="0"/>
-          <a:ext cx="0" cy="0"/>
-          <a:chOff x="0" y="0"/>
-          <a:chExt cx="0" cy="0"/>
-        </a:xfrm>
-      </p:grpSpPr>
-      <p:sp>
-        <p:nvSpPr>
-          <p:cNvPr id="2" name="Title 1">
-            <a:extLst>
-              <a:ext uri="{FF2B5EF4-FFF2-40B4-BE49-F238E27FC236}">
-                <a16:creationId xmlns:a16="http://schemas.microsoft.com/office/drawing/2014/main" id="{A95E2E6A-35EC-1B8E-0FD7-8C67870ACA64}"/>
-              </a:ext>
-            </a:extLst>
-          </p:cNvPr>
-          <p:cNvSpPr>
-            <a:spLocks noGrp="1"/>
-          </p:cNvSpPr>
-          <p:nvPr>
-            <p:ph type="title"/>
-          </p:nvPr>
-        </p:nvSpPr>
-        <p:spPr>
-          <a:xfrm>
-            <a:off x="2933700" y="568961"/>
-            <a:ext cx="8420100" cy="1780860"/>
-          </a:xfrm>
-        </p:spPr>
-        <p:txBody>
-          <a:bodyPr/>
-          <a:lstStyle/>
-          <a:p>
-            <a:r>
-              <a:rPr lang="en-US" dirty="0"/>
-              <a:t>Effective delivery techniques</a:t>
-            </a:r>
-          </a:p>
-        </p:txBody>
-      </p:sp>
-      <p:sp>
-        <p:nvSpPr>
-          <p:cNvPr id="12" name="Text Placeholder 11">
-            <a:extLst>
-              <a:ext uri="{FF2B5EF4-FFF2-40B4-BE49-F238E27FC236}">
-                <a16:creationId xmlns:a16="http://schemas.microsoft.com/office/drawing/2014/main" id="{554B61B9-26F6-B304-92CD-03053DAAF2A8}"/>
-              </a:ext>
-            </a:extLst>
-          </p:cNvPr>
-          <p:cNvSpPr>
-            <a:spLocks noGrp="1"/>
-          </p:cNvSpPr>
-          <p:nvPr>
-            <p:ph type="body" idx="1"/>
-          </p:nvPr>
-        </p:nvSpPr>
-        <p:spPr>
-          <a:xfrm>
-            <a:off x="2933700" y="2797255"/>
-            <a:ext cx="3924300" cy="464499"/>
-          </a:xfrm>
-        </p:spPr>
-        <p:txBody>
-          <a:bodyPr/>
-          <a:lstStyle/>
-          <a:p>
-            <a:r>
-              <a:rPr lang="en-US" dirty="0"/>
-              <a:t>Voice modulation</a:t>
-            </a:r>
-          </a:p>
-        </p:txBody>
-      </p:sp>
-      <p:sp>
-        <p:nvSpPr>
-          <p:cNvPr id="35" name="Content Placeholder 34">
-            <a:extLst>
-              <a:ext uri="{FF2B5EF4-FFF2-40B4-BE49-F238E27FC236}">
-                <a16:creationId xmlns:a16="http://schemas.microsoft.com/office/drawing/2014/main" id="{EDBE6233-75E9-40D1-968F-58CA9AD0FF50}"/>
-              </a:ext>
-            </a:extLst>
-          </p:cNvPr>
-          <p:cNvSpPr>
-            <a:spLocks noGrp="1"/>
-          </p:cNvSpPr>
-          <p:nvPr>
-            <p:ph sz="half" idx="13"/>
-          </p:nvPr>
-        </p:nvSpPr>
-        <p:spPr>
-          <a:xfrm>
-            <a:off x="2933700" y="3251596"/>
-            <a:ext cx="3943627" cy="3234264"/>
-          </a:xfrm>
-        </p:spPr>
-        <p:txBody>
-          <a:bodyPr>
-            <a:normAutofit/>
-          </a:bodyPr>
-          <a:lstStyle/>
-          <a:p>
-            <a:r>
-              <a:rPr lang="en-US" dirty="0"/>
-              <a:t>This is a powerful tool in public speaking. It involves varying pitch, tone, and volume to convey emotion, emphasize points, and maintain interest:</a:t>
-            </a:r>
-          </a:p>
-          <a:p>
-            <a:pPr lvl="1"/>
-            <a:r>
-              <a:rPr lang="en-US" dirty="0"/>
-              <a:t>Pitch variation</a:t>
-            </a:r>
-          </a:p>
-          <a:p>
-            <a:pPr lvl="1"/>
-            <a:r>
-              <a:rPr lang="en-US" dirty="0"/>
-              <a:t>Tone inflection</a:t>
-            </a:r>
-          </a:p>
-          <a:p>
-            <a:pPr lvl="1"/>
-            <a:r>
-              <a:rPr lang="en-US" dirty="0"/>
-              <a:t>Volume control</a:t>
-            </a:r>
-          </a:p>
-          <a:p>
-            <a:endParaRPr lang="en-US" dirty="0"/>
-          </a:p>
-        </p:txBody>
-      </p:sp>
-      <p:sp>
-        <p:nvSpPr>
-          <p:cNvPr id="14" name="Text Placeholder 13">
-            <a:extLst>
-              <a:ext uri="{FF2B5EF4-FFF2-40B4-BE49-F238E27FC236}">
-                <a16:creationId xmlns:a16="http://schemas.microsoft.com/office/drawing/2014/main" id="{CB9F9E8B-42CD-AC26-AFC9-F1F66695693B}"/>
-              </a:ext>
-            </a:extLst>
-          </p:cNvPr>
-          <p:cNvSpPr>
-            <a:spLocks noGrp="1"/>
-          </p:cNvSpPr>
-          <p:nvPr>
-            <p:ph type="body" sz="quarter" idx="3"/>
-          </p:nvPr>
-        </p:nvSpPr>
-        <p:spPr>
-          <a:xfrm>
-            <a:off x="7410173" y="2797255"/>
-            <a:ext cx="3943627" cy="464499"/>
-          </a:xfrm>
-        </p:spPr>
-        <p:txBody>
-          <a:bodyPr/>
-          <a:lstStyle/>
-          <a:p>
-            <a:r>
-              <a:rPr lang="en-US" dirty="0"/>
-              <a:t>Body language</a:t>
-            </a:r>
-          </a:p>
-        </p:txBody>
-      </p:sp>
-      <p:sp>
-        <p:nvSpPr>
-          <p:cNvPr id="50" name="Content Placeholder 49">
-            <a:extLst>
-              <a:ext uri="{FF2B5EF4-FFF2-40B4-BE49-F238E27FC236}">
-                <a16:creationId xmlns:a16="http://schemas.microsoft.com/office/drawing/2014/main" id="{8F6B2AE9-DDE4-FD99-A235-3B39EEE21481}"/>
-              </a:ext>
-            </a:extLst>
-          </p:cNvPr>
-          <p:cNvSpPr>
-            <a:spLocks noGrp="1"/>
-          </p:cNvSpPr>
-          <p:nvPr>
-            <p:ph sz="half" idx="14"/>
-          </p:nvPr>
-        </p:nvSpPr>
-        <p:spPr>
-          <a:xfrm>
-            <a:off x="7410173" y="3251595"/>
-            <a:ext cx="3943627" cy="3234264"/>
-          </a:xfrm>
-        </p:spPr>
-        <p:txBody>
-          <a:bodyPr>
-            <a:normAutofit/>
-          </a:bodyPr>
-          <a:lstStyle/>
-          <a:p>
-            <a:r>
-              <a:rPr lang="en-US" dirty="0"/>
-              <a:t>Effective body language enhances your message, making it more impactful </a:t>
-            </a:r>
-            <a:r>
-              <a:rPr lang="en-US"/>
-              <a:t>and memorable:</a:t>
-            </a:r>
-            <a:endParaRPr lang="en-US" dirty="0"/>
-          </a:p>
-          <a:p>
-            <a:pPr lvl="1"/>
-            <a:r>
-              <a:rPr lang="en-US" dirty="0"/>
-              <a:t>Meaningful eye contact</a:t>
-            </a:r>
-          </a:p>
-          <a:p>
-            <a:pPr lvl="1"/>
-            <a:r>
-              <a:rPr lang="en-US" dirty="0"/>
-              <a:t>Purposeful gestures</a:t>
-            </a:r>
-          </a:p>
-          <a:p>
-            <a:pPr lvl="1"/>
-            <a:r>
-              <a:rPr lang="en-US" dirty="0"/>
-              <a:t>Maintain good posture</a:t>
-            </a:r>
-          </a:p>
-          <a:p>
-            <a:pPr lvl="1"/>
-            <a:r>
-              <a:rPr lang="en-US" dirty="0"/>
-              <a:t>Control your expressions</a:t>
-            </a:r>
-          </a:p>
-        </p:txBody>
-      </p:sp>
-      <p:sp>
-        <p:nvSpPr>
-          <p:cNvPr id="8" name="Slide Number Placeholder 7">
-            <a:extLst>
-              <a:ext uri="{FF2B5EF4-FFF2-40B4-BE49-F238E27FC236}">
-                <a16:creationId xmlns:a16="http://schemas.microsoft.com/office/drawing/2014/main" id="{8F44A959-C2BB-9170-C99C-1A2EDB71B994}"/>
-              </a:ext>
-            </a:extLst>
-          </p:cNvPr>
-          <p:cNvSpPr>
-            <a:spLocks noGrp="1"/>
-          </p:cNvSpPr>
-          <p:nvPr>
-            <p:ph type="sldNum" sz="quarter" idx="12"/>
-          </p:nvPr>
-        </p:nvSpPr>
-        <p:spPr>
-          <a:xfrm>
-            <a:off x="10373350" y="6356349"/>
-            <a:ext cx="987552" cy="365125"/>
-          </a:xfrm>
-        </p:spPr>
-        <p:txBody>
-          <a:bodyPr/>
-          <a:lstStyle/>
-          <a:p>
-            <a:fld id="{A49DFD55-3C28-40EF-9E31-A92D2E4017FF}" type="slidenum">
-              <a:rPr lang="en-US" smtClean="0"/>
-              <a:pPr/>
-              <a:t>7</a:t>
-            </a:fld>
-            <a:endParaRPr lang="en-US" dirty="0"/>
-          </a:p>
-        </p:txBody>
-      </p:sp>
-    </p:spTree>
-    <p:extLst>
-      <p:ext uri="{BB962C8B-B14F-4D97-AF65-F5344CB8AC3E}">
-        <p14:creationId xmlns:p14="http://schemas.microsoft.com/office/powerpoint/2010/main" val="103458723"/>
-      </p:ext>
-    </p:extLst>
-  </p:cSld>
-  <p:clrMapOvr>
-    <a:masterClrMapping/>
-  </p:clrMapOvr>
-</p:sld>
-</file>
-
-<file path=ppt/slides/slide8.xml><?xml version="1.0" encoding="utf-8"?>
-<p:sld xmlns:a="http://schemas.openxmlformats.org/drawingml/2006/main" xmlns:r="http://schemas.openxmlformats.org/officeDocument/2006/relationships" xmlns:p="http://schemas.openxmlformats.org/presentationml/2006/main">
-  <p:cSld>
-    <p:spTree>
-      <p:nvGrpSpPr>
-        <p:cNvPr id="1" name=""/>
-        <p:cNvGrpSpPr/>
-        <p:nvPr/>
-      </p:nvGrpSpPr>
-      <p:grpSpPr>
-        <a:xfrm>
-          <a:off x="0" y="0"/>
-          <a:ext cx="0" cy="0"/>
-          <a:chOff x="0" y="0"/>
-          <a:chExt cx="0" cy="0"/>
-        </a:xfrm>
-      </p:grpSpPr>
-      <p:sp>
-        <p:nvSpPr>
-          <p:cNvPr id="2" name="Title 1">
-            <a:extLst>
-              <a:ext uri="{FF2B5EF4-FFF2-40B4-BE49-F238E27FC236}">
-                <a16:creationId xmlns:a16="http://schemas.microsoft.com/office/drawing/2014/main" id="{8B27D9B3-B64F-656A-0D99-161A6C0F518F}"/>
-              </a:ext>
-            </a:extLst>
-          </p:cNvPr>
-          <p:cNvSpPr>
-            <a:spLocks noGrp="1"/>
-          </p:cNvSpPr>
-          <p:nvPr>
-            <p:ph type="title"/>
-          </p:nvPr>
-        </p:nvSpPr>
-        <p:spPr>
-          <a:xfrm>
-            <a:off x="1341120" y="558801"/>
-            <a:ext cx="9953308" cy="1780860"/>
-          </a:xfrm>
-        </p:spPr>
-        <p:txBody>
-          <a:bodyPr/>
-          <a:lstStyle/>
-          <a:p>
-            <a:r>
-              <a:rPr lang="en-US" dirty="0"/>
-              <a:t>Navigating Q&amp;A Sessions</a:t>
-            </a:r>
-          </a:p>
-        </p:txBody>
-      </p:sp>
-      <p:sp>
-        <p:nvSpPr>
-          <p:cNvPr id="13" name="Text Placeholder 12">
-            <a:extLst>
-              <a:ext uri="{FF2B5EF4-FFF2-40B4-BE49-F238E27FC236}">
-                <a16:creationId xmlns:a16="http://schemas.microsoft.com/office/drawing/2014/main" id="{7E5B6E40-3A7D-ACF7-AA38-25977D322D81}"/>
-              </a:ext>
-            </a:extLst>
-          </p:cNvPr>
-          <p:cNvSpPr>
-            <a:spLocks noGrp="1"/>
-          </p:cNvSpPr>
-          <p:nvPr>
-            <p:ph type="body" idx="1"/>
-          </p:nvPr>
-        </p:nvSpPr>
-        <p:spPr>
-          <a:xfrm>
-            <a:off x="1341120" y="2960877"/>
-            <a:ext cx="2722880" cy="351284"/>
-          </a:xfrm>
-        </p:spPr>
-        <p:txBody>
-          <a:bodyPr/>
-          <a:lstStyle/>
-          <a:p>
-            <a:r>
-              <a:rPr lang="en-US" dirty="0"/>
-              <a:t>Preparing for questions</a:t>
-            </a:r>
-          </a:p>
-        </p:txBody>
-      </p:sp>
-      <p:sp>
-        <p:nvSpPr>
-          <p:cNvPr id="36" name="Content Placeholder 35">
-            <a:extLst>
-              <a:ext uri="{FF2B5EF4-FFF2-40B4-BE49-F238E27FC236}">
-                <a16:creationId xmlns:a16="http://schemas.microsoft.com/office/drawing/2014/main" id="{E71298F0-74F1-FECA-0F02-495F9A2EBA7B}"/>
-              </a:ext>
-            </a:extLst>
-          </p:cNvPr>
-          <p:cNvSpPr>
-            <a:spLocks noGrp="1"/>
-          </p:cNvSpPr>
-          <p:nvPr>
-            <p:ph sz="half" idx="15"/>
-          </p:nvPr>
-        </p:nvSpPr>
-        <p:spPr>
-          <a:xfrm>
-            <a:off x="1341120" y="3392035"/>
-            <a:ext cx="2722880" cy="2907164"/>
-          </a:xfrm>
-        </p:spPr>
-        <p:txBody>
-          <a:bodyPr>
-            <a:normAutofit/>
-          </a:bodyPr>
-          <a:lstStyle/>
-          <a:p>
-            <a:r>
-              <a:rPr lang="en-US" dirty="0"/>
-              <a:t>Know your material in advance</a:t>
-            </a:r>
-          </a:p>
-          <a:p>
-            <a:r>
-              <a:rPr lang="en-US" dirty="0"/>
-              <a:t>Anticipate common questions</a:t>
-            </a:r>
-          </a:p>
-          <a:p>
-            <a:r>
-              <a:rPr lang="en-US" dirty="0"/>
-              <a:t>Rehearse your responses</a:t>
-            </a:r>
-          </a:p>
-        </p:txBody>
-      </p:sp>
-      <p:sp>
-        <p:nvSpPr>
-          <p:cNvPr id="15" name="Text Placeholder 14">
-            <a:extLst>
-              <a:ext uri="{FF2B5EF4-FFF2-40B4-BE49-F238E27FC236}">
-                <a16:creationId xmlns:a16="http://schemas.microsoft.com/office/drawing/2014/main" id="{A536BD54-EFA1-25A2-9F04-4F22C36E2A5D}"/>
-              </a:ext>
-            </a:extLst>
-          </p:cNvPr>
-          <p:cNvSpPr>
-            <a:spLocks noGrp="1"/>
-          </p:cNvSpPr>
-          <p:nvPr>
-            <p:ph type="body" idx="10"/>
-          </p:nvPr>
-        </p:nvSpPr>
-        <p:spPr>
-          <a:xfrm>
-            <a:off x="4754881" y="2960877"/>
-            <a:ext cx="5516880" cy="351284"/>
-          </a:xfrm>
-        </p:spPr>
-        <p:txBody>
-          <a:bodyPr/>
-          <a:lstStyle/>
-          <a:p>
-            <a:r>
-              <a:rPr lang="en-US" dirty="0"/>
-              <a:t>Maintaining composure</a:t>
-            </a:r>
-          </a:p>
-          <a:p>
-            <a:endParaRPr lang="en-US" dirty="0"/>
-          </a:p>
-        </p:txBody>
-      </p:sp>
-      <p:sp>
-        <p:nvSpPr>
-          <p:cNvPr id="14" name="Content Placeholder 13">
-            <a:extLst>
-              <a:ext uri="{FF2B5EF4-FFF2-40B4-BE49-F238E27FC236}">
-                <a16:creationId xmlns:a16="http://schemas.microsoft.com/office/drawing/2014/main" id="{5112969F-EB84-49D5-7100-1FB28870FB30}"/>
-              </a:ext>
-            </a:extLst>
-          </p:cNvPr>
-          <p:cNvSpPr>
-            <a:spLocks noGrp="1"/>
-          </p:cNvSpPr>
-          <p:nvPr>
-            <p:ph sz="half" idx="14"/>
-          </p:nvPr>
-        </p:nvSpPr>
-        <p:spPr>
-          <a:xfrm>
-            <a:off x="4754881" y="3324859"/>
-            <a:ext cx="5506720" cy="3031489"/>
-          </a:xfrm>
-        </p:spPr>
-        <p:txBody>
-          <a:bodyPr>
-            <a:normAutofit/>
-          </a:bodyPr>
-          <a:lstStyle/>
-          <a:p>
-            <a:r>
-              <a:rPr lang="en-US" dirty="0"/>
-              <a:t>Maintaining composure during the Q&amp;A session is essential for projecting confidence and authority. Consider the following tips for staying composed:</a:t>
-            </a:r>
-          </a:p>
-          <a:p>
-            <a:pPr lvl="1"/>
-            <a:r>
-              <a:rPr lang="en-US" dirty="0"/>
-              <a:t>Stay calm</a:t>
-            </a:r>
-          </a:p>
-          <a:p>
-            <a:pPr lvl="1"/>
-            <a:r>
-              <a:rPr lang="en-US" dirty="0"/>
-              <a:t>Actively listen</a:t>
-            </a:r>
-          </a:p>
-          <a:p>
-            <a:pPr lvl="1"/>
-            <a:r>
-              <a:rPr lang="en-US" dirty="0"/>
-              <a:t>Pause and reflect</a:t>
-            </a:r>
-          </a:p>
-          <a:p>
-            <a:pPr lvl="1"/>
-            <a:r>
-              <a:rPr lang="en-US" dirty="0"/>
-              <a:t>Maintain eye contact</a:t>
-            </a:r>
-          </a:p>
-        </p:txBody>
-      </p:sp>
-      <p:sp>
-        <p:nvSpPr>
-          <p:cNvPr id="68" name="Slide Number Placeholder 67">
-            <a:extLst>
-              <a:ext uri="{FF2B5EF4-FFF2-40B4-BE49-F238E27FC236}">
-                <a16:creationId xmlns:a16="http://schemas.microsoft.com/office/drawing/2014/main" id="{AA0ACADD-CC4E-851C-DA07-C22DB97FA23E}"/>
-              </a:ext>
-            </a:extLst>
-          </p:cNvPr>
-          <p:cNvSpPr>
-            <a:spLocks noGrp="1"/>
-          </p:cNvSpPr>
-          <p:nvPr>
-            <p:ph type="sldNum" sz="quarter" idx="13"/>
-          </p:nvPr>
-        </p:nvSpPr>
-        <p:spPr>
-          <a:xfrm>
-            <a:off x="10373350" y="6356349"/>
-            <a:ext cx="987552" cy="365125"/>
-          </a:xfrm>
-        </p:spPr>
-        <p:txBody>
-          <a:bodyPr/>
-          <a:lstStyle/>
-          <a:p>
-            <a:fld id="{A49DFD55-3C28-40EF-9E31-A92D2E4017FF}" type="slidenum">
-              <a:rPr lang="en-US" smtClean="0"/>
-              <a:pPr/>
-              <a:t>8</a:t>
-            </a:fld>
-            <a:endParaRPr lang="en-US" dirty="0"/>
-          </a:p>
-        </p:txBody>
-      </p:sp>
-    </p:spTree>
-    <p:extLst>
-      <p:ext uri="{BB962C8B-B14F-4D97-AF65-F5344CB8AC3E}">
-        <p14:creationId xmlns:p14="http://schemas.microsoft.com/office/powerpoint/2010/main" val="636929804"/>
       </p:ext>
     </p:extLst>
   </p:cSld>
@@ -9937,10 +9176,10 @@
       </p:grpSpPr>
       <p:sp>
         <p:nvSpPr>
-          <p:cNvPr id="2" name="Title 1">
+          <p:cNvPr id="17" name="Title 1">
             <a:extLst>
               <a:ext uri="{FF2B5EF4-FFF2-40B4-BE49-F238E27FC236}">
-                <a16:creationId xmlns:a16="http://schemas.microsoft.com/office/drawing/2014/main" id="{4518FC28-E0BD-4387-B8BE-9965D1A57FF1}"/>
+                <a16:creationId xmlns:a16="http://schemas.microsoft.com/office/drawing/2014/main" id="{09140014-73D5-419B-8867-972BB18D52D4}"/>
               </a:ext>
             </a:extLst>
           </p:cNvPr>
@@ -9953,8 +9192,41 @@
         </p:nvSpPr>
         <p:spPr>
           <a:xfrm>
-            <a:off x="5476874" y="1671639"/>
-            <a:ext cx="5884027" cy="1204912"/>
+            <a:off x="838200" y="337192"/>
+            <a:ext cx="5655197" cy="1997867"/>
+          </a:xfrm>
+        </p:spPr>
+        <p:txBody>
+          <a:bodyPr anchor="b"/>
+          <a:lstStyle/>
+          <a:p>
+            <a:r>
+              <a:rPr lang="en-US" dirty="0"/>
+              <a:t>Final tips &amp; takeaways</a:t>
+            </a:r>
+          </a:p>
+        </p:txBody>
+      </p:sp>
+      <p:sp>
+        <p:nvSpPr>
+          <p:cNvPr id="6" name="Text Placeholder 5">
+            <a:extLst>
+              <a:ext uri="{FF2B5EF4-FFF2-40B4-BE49-F238E27FC236}">
+                <a16:creationId xmlns:a16="http://schemas.microsoft.com/office/drawing/2014/main" id="{D2E1CF79-4FDC-8CAF-CC16-E309A2C49758}"/>
+              </a:ext>
+            </a:extLst>
+          </p:cNvPr>
+          <p:cNvSpPr>
+            <a:spLocks noGrp="1"/>
+          </p:cNvSpPr>
+          <p:nvPr>
+            <p:ph type="body" idx="1"/>
+          </p:nvPr>
+        </p:nvSpPr>
+        <p:spPr>
+          <a:xfrm>
+            <a:off x="838200" y="2705177"/>
+            <a:ext cx="5733772" cy="448990"/>
           </a:xfrm>
         </p:spPr>
         <p:txBody>
@@ -9963,45 +9235,101 @@
           <a:p>
             <a:r>
               <a:rPr lang="en-US" dirty="0"/>
-              <a:t>Speaking Impact</a:t>
-            </a:r>
-          </a:p>
-        </p:txBody>
-      </p:sp>
-      <p:pic>
-        <p:nvPicPr>
-          <p:cNvPr id="47" name="Picture Placeholder 46" descr="A person smiling with a shadow on the wall">
+              <a:t>Practice makes perfect</a:t>
+            </a:r>
+          </a:p>
+        </p:txBody>
+      </p:sp>
+      <p:sp>
+        <p:nvSpPr>
+          <p:cNvPr id="20" name="Content Placeholder 3">
             <a:extLst>
               <a:ext uri="{FF2B5EF4-FFF2-40B4-BE49-F238E27FC236}">
-                <a16:creationId xmlns:a16="http://schemas.microsoft.com/office/drawing/2014/main" id="{F55BC7A4-EE4B-7EFC-C325-408D66C3CBA7}"/>
+                <a16:creationId xmlns:a16="http://schemas.microsoft.com/office/drawing/2014/main" id="{33D8731E-4977-402E-8BFD-895B4D0544CC}"/>
               </a:ext>
             </a:extLst>
           </p:cNvPr>
-          <p:cNvPicPr>
-            <a:picLocks noGrp="1" noChangeAspect="1"/>
-          </p:cNvPicPr>
-          <p:nvPr>
-            <p:ph type="pic" sz="quarter" idx="13"/>
-          </p:nvPr>
-        </p:nvPicPr>
-        <p:blipFill>
-          <a:blip r:embed="rId3"/>
-          <a:srcRect l="112" r="112"/>
-          <a:stretch/>
-        </p:blipFill>
+          <p:cNvSpPr>
+            <a:spLocks noGrp="1"/>
+          </p:cNvSpPr>
+          <p:nvPr>
+            <p:ph sz="half" idx="2"/>
+          </p:nvPr>
+        </p:nvSpPr>
         <p:spPr>
           <a:xfrm>
-            <a:off x="-28230" y="-9144"/>
-            <a:ext cx="5481955" cy="6876288"/>
+            <a:off x="838199" y="3154166"/>
+            <a:ext cx="5733773" cy="3032733"/>
           </a:xfrm>
         </p:spPr>
-      </p:pic>
-      <p:sp>
-        <p:nvSpPr>
-          <p:cNvPr id="6" name="Slide Number Placeholder 5">
+        <p:txBody>
+          <a:bodyPr>
+            <a:noAutofit/>
+          </a:bodyPr>
+          <a:lstStyle/>
+          <a:p>
+            <a:r>
+              <a:rPr lang="en-US" dirty="0"/>
+              <a:t>Consistent rehearsal</a:t>
+            </a:r>
+          </a:p>
+          <a:p>
+            <a:pPr lvl="1"/>
+            <a:r>
+              <a:rPr lang="en-US" dirty="0"/>
+              <a:t>Strengthen your familiarity</a:t>
+            </a:r>
+          </a:p>
+          <a:p>
+            <a:r>
+              <a:rPr lang="en-US" dirty="0"/>
+              <a:t>Refine delivery style</a:t>
+            </a:r>
+          </a:p>
+          <a:p>
+            <a:pPr lvl="1"/>
+            <a:r>
+              <a:rPr lang="en-US" dirty="0"/>
+              <a:t>Pacing, tone, and emphasis</a:t>
+            </a:r>
+          </a:p>
+          <a:p>
+            <a:r>
+              <a:rPr lang="en-US" dirty="0"/>
+              <a:t>Timing and transitions</a:t>
+            </a:r>
+          </a:p>
+          <a:p>
+            <a:pPr lvl="1"/>
+            <a:r>
+              <a:rPr lang="en-US" dirty="0"/>
+              <a:t>Aim for seamless, professional delivery</a:t>
+            </a:r>
+          </a:p>
+          <a:p>
+            <a:r>
+              <a:rPr lang="en-US" dirty="0"/>
+              <a:t>Practice audience</a:t>
+            </a:r>
+          </a:p>
+          <a:p>
+            <a:pPr lvl="1"/>
+            <a:r>
+              <a:rPr lang="en-US" dirty="0"/>
+              <a:t>Enlist colleagues to listen &amp; provide feedback</a:t>
+            </a:r>
+          </a:p>
+          <a:p>
+            <a:endParaRPr lang="en-US" dirty="0"/>
+          </a:p>
+        </p:txBody>
+      </p:sp>
+      <p:sp>
+        <p:nvSpPr>
+          <p:cNvPr id="34" name="Text Placeholder 33">
             <a:extLst>
               <a:ext uri="{FF2B5EF4-FFF2-40B4-BE49-F238E27FC236}">
-                <a16:creationId xmlns:a16="http://schemas.microsoft.com/office/drawing/2014/main" id="{7C4B8313-9270-4128-8674-3A3E42B806BC}"/>
+                <a16:creationId xmlns:a16="http://schemas.microsoft.com/office/drawing/2014/main" id="{AE07A905-8B37-D13F-25D3-1D3BCDB86B0B}"/>
               </a:ext>
             </a:extLst>
           </p:cNvPr>
@@ -10009,13 +9337,105 @@
             <a:spLocks noGrp="1"/>
           </p:cNvSpPr>
           <p:nvPr>
-            <p:ph type="sldNum" sz="quarter" idx="12"/>
+            <p:ph type="body" sz="quarter" idx="3"/>
           </p:nvPr>
         </p:nvSpPr>
         <p:spPr>
           <a:xfrm>
-            <a:off x="10373350" y="6356349"/>
-            <a:ext cx="987552" cy="365125"/>
+            <a:off x="7887108" y="2705177"/>
+            <a:ext cx="3943627" cy="448989"/>
+          </a:xfrm>
+        </p:spPr>
+        <p:txBody>
+          <a:bodyPr/>
+          <a:lstStyle/>
+          <a:p>
+            <a:r>
+              <a:rPr lang="en-US" dirty="0"/>
+              <a:t>Continue improving</a:t>
+            </a:r>
+          </a:p>
+        </p:txBody>
+      </p:sp>
+      <p:sp>
+        <p:nvSpPr>
+          <p:cNvPr id="35" name="Content Placeholder 34">
+            <a:extLst>
+              <a:ext uri="{FF2B5EF4-FFF2-40B4-BE49-F238E27FC236}">
+                <a16:creationId xmlns:a16="http://schemas.microsoft.com/office/drawing/2014/main" id="{4E9A764F-6B65-050E-E561-82F77339D164}"/>
+              </a:ext>
+            </a:extLst>
+          </p:cNvPr>
+          <p:cNvSpPr>
+            <a:spLocks noGrp="1"/>
+          </p:cNvSpPr>
+          <p:nvPr>
+            <p:ph sz="half" idx="14"/>
+          </p:nvPr>
+        </p:nvSpPr>
+        <p:spPr>
+          <a:xfrm>
+            <a:off x="7887107" y="3164867"/>
+            <a:ext cx="3943627" cy="3032733"/>
+          </a:xfrm>
+        </p:spPr>
+        <p:txBody>
+          <a:bodyPr>
+            <a:normAutofit/>
+          </a:bodyPr>
+          <a:lstStyle/>
+          <a:p>
+            <a:r>
+              <a:rPr lang="en-US" dirty="0"/>
+              <a:t>Seek feedback</a:t>
+            </a:r>
+          </a:p>
+          <a:p>
+            <a:r>
+              <a:rPr lang="en-US" dirty="0"/>
+              <a:t>Reflect on performance</a:t>
+            </a:r>
+          </a:p>
+          <a:p>
+            <a:r>
+              <a:rPr lang="en-US" dirty="0"/>
+              <a:t>Explore new techniques</a:t>
+            </a:r>
+          </a:p>
+          <a:p>
+            <a:r>
+              <a:rPr lang="en-US" dirty="0"/>
+              <a:t>Set personal goals</a:t>
+            </a:r>
+          </a:p>
+          <a:p>
+            <a:r>
+              <a:rPr lang="en-US" dirty="0"/>
+              <a:t>Iterate and adapt</a:t>
+            </a:r>
+          </a:p>
+        </p:txBody>
+      </p:sp>
+      <p:sp>
+        <p:nvSpPr>
+          <p:cNvPr id="9" name="Slide Number Placeholder 8">
+            <a:extLst>
+              <a:ext uri="{FF2B5EF4-FFF2-40B4-BE49-F238E27FC236}">
+                <a16:creationId xmlns:a16="http://schemas.microsoft.com/office/drawing/2014/main" id="{C396FFDC-ADE8-4009-A466-A81787258E88}"/>
+              </a:ext>
+            </a:extLst>
+          </p:cNvPr>
+          <p:cNvSpPr>
+            <a:spLocks noGrp="1"/>
+          </p:cNvSpPr>
+          <p:nvPr>
+            <p:ph type="sldNum" sz="quarter" idx="12"/>
+          </p:nvPr>
+        </p:nvSpPr>
+        <p:spPr>
+          <a:xfrm>
+            <a:off x="8610600" y="6356350"/>
+            <a:ext cx="2743200" cy="365125"/>
           </a:xfrm>
         </p:spPr>
         <p:txBody>
@@ -10031,97 +9451,10 @@
           </a:p>
         </p:txBody>
       </p:sp>
-      <p:sp>
-        <p:nvSpPr>
-          <p:cNvPr id="3" name="Text Placeholder 2">
-            <a:extLst>
-              <a:ext uri="{FF2B5EF4-FFF2-40B4-BE49-F238E27FC236}">
-                <a16:creationId xmlns:a16="http://schemas.microsoft.com/office/drawing/2014/main" id="{FED19BCA-B61F-4EA6-A1FB-CCA3BD8506FB}"/>
-              </a:ext>
-            </a:extLst>
-          </p:cNvPr>
-          <p:cNvSpPr>
-            <a:spLocks noGrp="1"/>
-          </p:cNvSpPr>
-          <p:nvPr>
-            <p:ph sz="half" idx="14"/>
-          </p:nvPr>
-        </p:nvSpPr>
-        <p:spPr>
-          <a:xfrm>
-            <a:off x="5453725" y="3660774"/>
-            <a:ext cx="5907176" cy="2536826"/>
-          </a:xfrm>
-        </p:spPr>
-        <p:txBody>
-          <a:bodyPr>
-            <a:noAutofit/>
-          </a:bodyPr>
-          <a:lstStyle/>
-          <a:p>
-            <a:r>
-              <a:rPr lang="en-US" dirty="0"/>
-              <a:t>Your ability to communicate effectively will leave a lasting impact on your audience</a:t>
-            </a:r>
-          </a:p>
-          <a:p>
-            <a:r>
-              <a:rPr lang="en-US" dirty="0"/>
-              <a:t>Effectively communicating involves not only delivering a message but also resonating with the experiences, values, and emotions of those listening </a:t>
-            </a:r>
-          </a:p>
-        </p:txBody>
-      </p:sp>
-      <p:cxnSp>
-        <p:nvCxnSpPr>
-          <p:cNvPr id="23" name="Straight Connector 22">
-            <a:extLst>
-              <a:ext uri="{FF2B5EF4-FFF2-40B4-BE49-F238E27FC236}">
-                <a16:creationId xmlns:a16="http://schemas.microsoft.com/office/drawing/2014/main" id="{D87F08D6-2CA7-4A5A-BE34-07113DCA535D}"/>
-              </a:ext>
-              <a:ext uri="{C183D7F6-B498-43B3-948B-1728B52AA6E4}">
-                <adec:decorative xmlns:adec="http://schemas.microsoft.com/office/drawing/2017/decorative" val="1"/>
-              </a:ext>
-            </a:extLst>
-          </p:cNvPr>
-          <p:cNvCxnSpPr>
-            <a:cxnSpLocks/>
-          </p:cNvCxnSpPr>
-          <p:nvPr userDrawn="1"/>
-        </p:nvCxnSpPr>
-        <p:spPr>
-          <a:xfrm flipH="1" flipV="1">
-            <a:off x="0" y="876300"/>
-            <a:ext cx="5246255" cy="1709882"/>
-          </a:xfrm>
-          <a:prstGeom prst="line">
-            <a:avLst/>
-          </a:prstGeom>
-          <a:ln>
-            <a:solidFill>
-              <a:schemeClr val="tx1"/>
-            </a:solidFill>
-          </a:ln>
-        </p:spPr>
-        <p:style>
-          <a:lnRef idx="1">
-            <a:schemeClr val="accent1"/>
-          </a:lnRef>
-          <a:fillRef idx="0">
-            <a:schemeClr val="accent1"/>
-          </a:fillRef>
-          <a:effectRef idx="0">
-            <a:schemeClr val="accent1"/>
-          </a:effectRef>
-          <a:fontRef idx="minor">
-            <a:schemeClr val="tx1"/>
-          </a:fontRef>
-        </p:style>
-      </p:cxnSp>
     </p:spTree>
     <p:extLst>
       <p:ext uri="{BB962C8B-B14F-4D97-AF65-F5344CB8AC3E}">
-        <p14:creationId xmlns:p14="http://schemas.microsoft.com/office/powerpoint/2010/main" val="1742861620"/>
+        <p14:creationId xmlns:p14="http://schemas.microsoft.com/office/powerpoint/2010/main" val="2403577982"/>
       </p:ext>
     </p:extLst>
   </p:cSld>

</xml_diff>